<commit_message>
updated presentation w github link
</commit_message>
<xml_diff>
--- a/6-17-24 Meeting Resources/presentation.pptx
+++ b/6-17-24 Meeting Resources/presentation.pptx
@@ -5,30 +5,31 @@
     <p:sldMasterId id="2147483648" r:id="rId1"/>
   </p:sldMasterIdLst>
   <p:notesMasterIdLst>
-    <p:notesMasterId r:id="rId23"/>
+    <p:notesMasterId r:id="rId24"/>
   </p:notesMasterIdLst>
   <p:sldIdLst>
-    <p:sldId id="256" r:id="rId2"/>
-    <p:sldId id="257" r:id="rId3"/>
-    <p:sldId id="260" r:id="rId4"/>
-    <p:sldId id="261" r:id="rId5"/>
-    <p:sldId id="265" r:id="rId6"/>
-    <p:sldId id="277" r:id="rId7"/>
-    <p:sldId id="278" r:id="rId8"/>
-    <p:sldId id="262" r:id="rId9"/>
-    <p:sldId id="263" r:id="rId10"/>
-    <p:sldId id="264" r:id="rId11"/>
-    <p:sldId id="266" r:id="rId12"/>
-    <p:sldId id="267" r:id="rId13"/>
-    <p:sldId id="272" r:id="rId14"/>
-    <p:sldId id="273" r:id="rId15"/>
-    <p:sldId id="271" r:id="rId16"/>
-    <p:sldId id="274" r:id="rId17"/>
-    <p:sldId id="275" r:id="rId18"/>
-    <p:sldId id="268" r:id="rId19"/>
-    <p:sldId id="270" r:id="rId20"/>
-    <p:sldId id="269" r:id="rId21"/>
-    <p:sldId id="276" r:id="rId22"/>
+    <p:sldId id="279" r:id="rId2"/>
+    <p:sldId id="256" r:id="rId3"/>
+    <p:sldId id="257" r:id="rId4"/>
+    <p:sldId id="260" r:id="rId5"/>
+    <p:sldId id="261" r:id="rId6"/>
+    <p:sldId id="265" r:id="rId7"/>
+    <p:sldId id="277" r:id="rId8"/>
+    <p:sldId id="278" r:id="rId9"/>
+    <p:sldId id="262" r:id="rId10"/>
+    <p:sldId id="263" r:id="rId11"/>
+    <p:sldId id="264" r:id="rId12"/>
+    <p:sldId id="266" r:id="rId13"/>
+    <p:sldId id="267" r:id="rId14"/>
+    <p:sldId id="272" r:id="rId15"/>
+    <p:sldId id="273" r:id="rId16"/>
+    <p:sldId id="271" r:id="rId17"/>
+    <p:sldId id="274" r:id="rId18"/>
+    <p:sldId id="275" r:id="rId19"/>
+    <p:sldId id="268" r:id="rId20"/>
+    <p:sldId id="270" r:id="rId21"/>
+    <p:sldId id="269" r:id="rId22"/>
+    <p:sldId id="276" r:id="rId23"/>
   </p:sldIdLst>
   <p:sldSz cx="12192000" cy="6858000"/>
   <p:notesSz cx="6858000" cy="9144000"/>
@@ -773,7 +774,7 @@
           <a:p>
             <a:fld id="{C512DD5C-5F8C-4E5A-AF52-F59DFA8BE5AE}" type="slidenum">
               <a:rPr lang="en-US" smtClean="0"/>
-              <a:t>7</a:t>
+              <a:t>8</a:t>
             </a:fld>
             <a:endParaRPr lang="en-US"/>
           </a:p>
@@ -4016,400 +4017,54 @@
           <a:chExt cx="0" cy="0"/>
         </a:xfrm>
       </p:grpSpPr>
-      <p:pic>
-        <p:nvPicPr>
-          <p:cNvPr id="5" name="Picture 4">
-            <a:extLst>
-              <a:ext uri="{FF2B5EF4-FFF2-40B4-BE49-F238E27FC236}">
-                <a16:creationId xmlns:a16="http://schemas.microsoft.com/office/drawing/2014/main" id="{367CAF27-8B7F-0206-02DD-91AA869173D7}"/>
-              </a:ext>
-            </a:extLst>
-          </p:cNvPr>
-          <p:cNvPicPr>
-            <a:picLocks noChangeAspect="1"/>
-          </p:cNvPicPr>
+      <p:sp>
+        <p:nvSpPr>
+          <p:cNvPr id="3" name="TextBox 2">
+            <a:extLst>
+              <a:ext uri="{FF2B5EF4-FFF2-40B4-BE49-F238E27FC236}">
+                <a16:creationId xmlns:a16="http://schemas.microsoft.com/office/drawing/2014/main" id="{1C41A7F5-496F-7CCA-530D-2F81C080F9B0}"/>
+              </a:ext>
+            </a:extLst>
+          </p:cNvPr>
+          <p:cNvSpPr txBox="1"/>
           <p:nvPr/>
-        </p:nvPicPr>
-        <p:blipFill>
-          <a:blip r:embed="rId2"/>
-          <a:stretch>
-            <a:fillRect/>
-          </a:stretch>
-        </p:blipFill>
-        <p:spPr>
-          <a:xfrm>
-            <a:off x="131711" y="1158892"/>
-            <a:ext cx="1658384" cy="2523794"/>
-          </a:xfrm>
-          <a:prstGeom prst="rect">
-            <a:avLst/>
-          </a:prstGeom>
-        </p:spPr>
-      </p:pic>
-      <p:pic>
-        <p:nvPicPr>
-          <p:cNvPr id="9" name="Picture 8">
-            <a:extLst>
-              <a:ext uri="{FF2B5EF4-FFF2-40B4-BE49-F238E27FC236}">
-                <a16:creationId xmlns:a16="http://schemas.microsoft.com/office/drawing/2014/main" id="{46312393-49E7-9E41-81EB-67C9E949AD42}"/>
-              </a:ext>
-            </a:extLst>
-          </p:cNvPr>
-          <p:cNvPicPr>
-            <a:picLocks noChangeAspect="1"/>
-          </p:cNvPicPr>
-          <p:nvPr/>
-        </p:nvPicPr>
-        <p:blipFill>
-          <a:blip r:embed="rId3"/>
-          <a:stretch>
-            <a:fillRect/>
-          </a:stretch>
-        </p:blipFill>
-        <p:spPr>
-          <a:xfrm>
-            <a:off x="131711" y="138175"/>
-            <a:ext cx="3912184" cy="969181"/>
-          </a:xfrm>
-          <a:prstGeom prst="rect">
-            <a:avLst/>
-          </a:prstGeom>
-        </p:spPr>
-      </p:pic>
-      <p:pic>
-        <p:nvPicPr>
-          <p:cNvPr id="11" name="Picture 10">
-            <a:extLst>
-              <a:ext uri="{FF2B5EF4-FFF2-40B4-BE49-F238E27FC236}">
-                <a16:creationId xmlns:a16="http://schemas.microsoft.com/office/drawing/2014/main" id="{3569B3D7-E3B3-BFF3-41B5-4B217BE6DE75}"/>
-              </a:ext>
-            </a:extLst>
-          </p:cNvPr>
-          <p:cNvPicPr>
-            <a:picLocks noChangeAspect="1"/>
-          </p:cNvPicPr>
-          <p:nvPr/>
-        </p:nvPicPr>
-        <p:blipFill>
-          <a:blip r:embed="rId4"/>
-          <a:stretch>
-            <a:fillRect/>
-          </a:stretch>
-        </p:blipFill>
-        <p:spPr>
-          <a:xfrm>
-            <a:off x="1946192" y="1158892"/>
-            <a:ext cx="1441848" cy="3301832"/>
-          </a:xfrm>
-          <a:prstGeom prst="rect">
-            <a:avLst/>
-          </a:prstGeom>
-        </p:spPr>
-      </p:pic>
-      <p:pic>
-        <p:nvPicPr>
-          <p:cNvPr id="13" name="Picture 12">
-            <a:extLst>
-              <a:ext uri="{FF2B5EF4-FFF2-40B4-BE49-F238E27FC236}">
-                <a16:creationId xmlns:a16="http://schemas.microsoft.com/office/drawing/2014/main" id="{993053EE-C1D6-2D11-965C-C1397E4747A6}"/>
-              </a:ext>
-            </a:extLst>
-          </p:cNvPr>
-          <p:cNvPicPr>
-            <a:picLocks noChangeAspect="1"/>
-          </p:cNvPicPr>
-          <p:nvPr/>
-        </p:nvPicPr>
-        <p:blipFill>
-          <a:blip r:embed="rId5"/>
-          <a:stretch>
-            <a:fillRect/>
-          </a:stretch>
-        </p:blipFill>
-        <p:spPr>
-          <a:xfrm>
-            <a:off x="3423682" y="1195009"/>
-            <a:ext cx="1441847" cy="3402567"/>
-          </a:xfrm>
-          <a:prstGeom prst="rect">
-            <a:avLst/>
-          </a:prstGeom>
-        </p:spPr>
-      </p:pic>
-      <p:pic>
-        <p:nvPicPr>
-          <p:cNvPr id="15" name="Picture 14">
-            <a:extLst>
-              <a:ext uri="{FF2B5EF4-FFF2-40B4-BE49-F238E27FC236}">
-                <a16:creationId xmlns:a16="http://schemas.microsoft.com/office/drawing/2014/main" id="{F7E4C45D-F7CC-DF5A-48B6-1636AD5550A1}"/>
-              </a:ext>
-            </a:extLst>
-          </p:cNvPr>
-          <p:cNvPicPr>
-            <a:picLocks noChangeAspect="1"/>
-          </p:cNvPicPr>
-          <p:nvPr/>
-        </p:nvPicPr>
-        <p:blipFill>
-          <a:blip r:embed="rId6"/>
-          <a:stretch>
-            <a:fillRect/>
-          </a:stretch>
-        </p:blipFill>
-        <p:spPr>
-          <a:xfrm>
-            <a:off x="186087" y="3734222"/>
-            <a:ext cx="1578829" cy="1867765"/>
-          </a:xfrm>
-          <a:prstGeom prst="rect">
-            <a:avLst/>
-          </a:prstGeom>
-        </p:spPr>
-      </p:pic>
-      <p:pic>
-        <p:nvPicPr>
-          <p:cNvPr id="17" name="Picture 16">
-            <a:extLst>
-              <a:ext uri="{FF2B5EF4-FFF2-40B4-BE49-F238E27FC236}">
-                <a16:creationId xmlns:a16="http://schemas.microsoft.com/office/drawing/2014/main" id="{F25BD4EA-CEBB-D70F-C266-A21544C6A8E4}"/>
-              </a:ext>
-            </a:extLst>
-          </p:cNvPr>
-          <p:cNvPicPr>
-            <a:picLocks noChangeAspect="1"/>
-          </p:cNvPicPr>
-          <p:nvPr/>
-        </p:nvPicPr>
-        <p:blipFill>
-          <a:blip r:embed="rId7"/>
-          <a:stretch>
-            <a:fillRect/>
-          </a:stretch>
-        </p:blipFill>
-        <p:spPr>
-          <a:xfrm>
-            <a:off x="4906616" y="198629"/>
-            <a:ext cx="1425116" cy="3072973"/>
-          </a:xfrm>
-          <a:prstGeom prst="rect">
-            <a:avLst/>
-          </a:prstGeom>
-        </p:spPr>
-      </p:pic>
-      <p:pic>
-        <p:nvPicPr>
-          <p:cNvPr id="19" name="Picture 18">
-            <a:extLst>
-              <a:ext uri="{FF2B5EF4-FFF2-40B4-BE49-F238E27FC236}">
-                <a16:creationId xmlns:a16="http://schemas.microsoft.com/office/drawing/2014/main" id="{2D1230EF-B7E6-7C05-4A2B-838F949C04F1}"/>
-              </a:ext>
-            </a:extLst>
-          </p:cNvPr>
-          <p:cNvPicPr>
-            <a:picLocks noChangeAspect="1"/>
-          </p:cNvPicPr>
-          <p:nvPr/>
-        </p:nvPicPr>
-        <p:blipFill>
-          <a:blip r:embed="rId8"/>
-          <a:stretch>
-            <a:fillRect/>
-          </a:stretch>
-        </p:blipFill>
-        <p:spPr>
-          <a:xfrm>
-            <a:off x="6396313" y="249300"/>
-            <a:ext cx="2295761" cy="2893181"/>
-          </a:xfrm>
-          <a:prstGeom prst="rect">
-            <a:avLst/>
-          </a:prstGeom>
-        </p:spPr>
-      </p:pic>
-      <p:pic>
-        <p:nvPicPr>
-          <p:cNvPr id="21" name="Picture 20">
-            <a:extLst>
-              <a:ext uri="{FF2B5EF4-FFF2-40B4-BE49-F238E27FC236}">
-                <a16:creationId xmlns:a16="http://schemas.microsoft.com/office/drawing/2014/main" id="{C7067457-7856-EBBE-7A37-7F8CE8846A8A}"/>
-              </a:ext>
-            </a:extLst>
-          </p:cNvPr>
-          <p:cNvPicPr>
-            <a:picLocks noChangeAspect="1"/>
-          </p:cNvPicPr>
-          <p:nvPr/>
-        </p:nvPicPr>
-        <p:blipFill>
-          <a:blip r:embed="rId9"/>
-          <a:stretch>
-            <a:fillRect/>
-          </a:stretch>
-        </p:blipFill>
-        <p:spPr>
-          <a:xfrm>
-            <a:off x="8756655" y="249300"/>
-            <a:ext cx="1657877" cy="3877166"/>
-          </a:xfrm>
-          <a:prstGeom prst="rect">
-            <a:avLst/>
-          </a:prstGeom>
-        </p:spPr>
-      </p:pic>
-      <p:pic>
-        <p:nvPicPr>
-          <p:cNvPr id="23" name="Picture 22">
-            <a:extLst>
-              <a:ext uri="{FF2B5EF4-FFF2-40B4-BE49-F238E27FC236}">
-                <a16:creationId xmlns:a16="http://schemas.microsoft.com/office/drawing/2014/main" id="{57A7377A-B26D-DE51-F4E8-6C9F94E45C9C}"/>
-              </a:ext>
-            </a:extLst>
-          </p:cNvPr>
-          <p:cNvPicPr>
-            <a:picLocks noChangeAspect="1"/>
-          </p:cNvPicPr>
-          <p:nvPr/>
-        </p:nvPicPr>
-        <p:blipFill>
-          <a:blip r:embed="rId10"/>
-          <a:stretch>
-            <a:fillRect/>
-          </a:stretch>
-        </p:blipFill>
-        <p:spPr>
-          <a:xfrm>
-            <a:off x="8822230" y="4246596"/>
-            <a:ext cx="1660751" cy="684268"/>
-          </a:xfrm>
-          <a:prstGeom prst="rect">
-            <a:avLst/>
-          </a:prstGeom>
-        </p:spPr>
-      </p:pic>
-      <p:pic>
-        <p:nvPicPr>
-          <p:cNvPr id="25" name="Picture 24">
-            <a:extLst>
-              <a:ext uri="{FF2B5EF4-FFF2-40B4-BE49-F238E27FC236}">
-                <a16:creationId xmlns:a16="http://schemas.microsoft.com/office/drawing/2014/main" id="{AEBBC3D8-824E-953D-58DC-69C533031A9E}"/>
-              </a:ext>
-            </a:extLst>
-          </p:cNvPr>
-          <p:cNvPicPr>
-            <a:picLocks noChangeAspect="1"/>
-          </p:cNvPicPr>
-          <p:nvPr/>
-        </p:nvPicPr>
-        <p:blipFill>
-          <a:blip r:embed="rId11"/>
-          <a:stretch>
-            <a:fillRect/>
-          </a:stretch>
-        </p:blipFill>
-        <p:spPr>
-          <a:xfrm>
-            <a:off x="10551431" y="249300"/>
-            <a:ext cx="1508858" cy="4248016"/>
-          </a:xfrm>
-          <a:prstGeom prst="rect">
-            <a:avLst/>
-          </a:prstGeom>
-        </p:spPr>
-      </p:pic>
-      <p:pic>
-        <p:nvPicPr>
-          <p:cNvPr id="27" name="Picture 26">
-            <a:extLst>
-              <a:ext uri="{FF2B5EF4-FFF2-40B4-BE49-F238E27FC236}">
-                <a16:creationId xmlns:a16="http://schemas.microsoft.com/office/drawing/2014/main" id="{C2245C44-342D-6FCF-6541-EA53A01D133F}"/>
-              </a:ext>
-            </a:extLst>
-          </p:cNvPr>
-          <p:cNvPicPr>
-            <a:picLocks noChangeAspect="1"/>
-          </p:cNvPicPr>
-          <p:nvPr/>
-        </p:nvPicPr>
-        <p:blipFill>
-          <a:blip r:embed="rId12"/>
-          <a:stretch>
-            <a:fillRect/>
-          </a:stretch>
-        </p:blipFill>
-        <p:spPr>
-          <a:xfrm>
-            <a:off x="4901171" y="3309747"/>
-            <a:ext cx="1508857" cy="3155148"/>
-          </a:xfrm>
-          <a:prstGeom prst="rect">
-            <a:avLst/>
-          </a:prstGeom>
-        </p:spPr>
-      </p:pic>
-      <p:pic>
-        <p:nvPicPr>
-          <p:cNvPr id="29" name="Picture 28">
-            <a:extLst>
-              <a:ext uri="{FF2B5EF4-FFF2-40B4-BE49-F238E27FC236}">
-                <a16:creationId xmlns:a16="http://schemas.microsoft.com/office/drawing/2014/main" id="{5BAF1578-F8DA-A30B-A1D4-16B55661AE8F}"/>
-              </a:ext>
-            </a:extLst>
-          </p:cNvPr>
-          <p:cNvPicPr>
-            <a:picLocks noChangeAspect="1"/>
-          </p:cNvPicPr>
-          <p:nvPr/>
-        </p:nvPicPr>
-        <p:blipFill>
-          <a:blip r:embed="rId13"/>
-          <a:stretch>
-            <a:fillRect/>
-          </a:stretch>
-        </p:blipFill>
-        <p:spPr>
-          <a:xfrm>
-            <a:off x="6474609" y="3336357"/>
-            <a:ext cx="1562118" cy="3078957"/>
-          </a:xfrm>
-          <a:prstGeom prst="rect">
-            <a:avLst/>
-          </a:prstGeom>
-        </p:spPr>
-      </p:pic>
-      <p:pic>
-        <p:nvPicPr>
-          <p:cNvPr id="31" name="Picture 30">
-            <a:extLst>
-              <a:ext uri="{FF2B5EF4-FFF2-40B4-BE49-F238E27FC236}">
-                <a16:creationId xmlns:a16="http://schemas.microsoft.com/office/drawing/2014/main" id="{6B276FCE-7392-9C97-535F-878E316E1E95}"/>
-              </a:ext>
-            </a:extLst>
-          </p:cNvPr>
-          <p:cNvPicPr>
-            <a:picLocks noChangeAspect="1"/>
-          </p:cNvPicPr>
-          <p:nvPr/>
-        </p:nvPicPr>
-        <p:blipFill>
-          <a:blip r:embed="rId14"/>
-          <a:stretch>
-            <a:fillRect/>
-          </a:stretch>
-        </p:blipFill>
-        <p:spPr>
-          <a:xfrm>
-            <a:off x="8362815" y="5050994"/>
-            <a:ext cx="1657877" cy="1425911"/>
-          </a:xfrm>
-          <a:prstGeom prst="rect">
-            <a:avLst/>
-          </a:prstGeom>
-        </p:spPr>
-      </p:pic>
+        </p:nvSpPr>
+        <p:spPr>
+          <a:xfrm>
+            <a:off x="1165981" y="3167390"/>
+            <a:ext cx="13507962" cy="523220"/>
+          </a:xfrm>
+          <a:prstGeom prst="rect">
+            <a:avLst/>
+          </a:prstGeom>
+          <a:noFill/>
+        </p:spPr>
+        <p:txBody>
+          <a:bodyPr wrap="square">
+            <a:spAutoFit/>
+          </a:bodyPr>
+          <a:lstStyle/>
+          <a:p>
+            <a:r>
+              <a:rPr lang="en-US" sz="2800" b="1" dirty="0" err="1">
+                <a:hlinkClick r:id="rId2"/>
+              </a:rPr>
+              <a:t>chrispyroberts</a:t>
+            </a:r>
+            <a:r>
+              <a:rPr lang="en-US" sz="2800" b="1" dirty="0">
+                <a:hlinkClick r:id="rId2"/>
+              </a:rPr>
+              <a:t>/Strange-Quark-Tagging: SURF 2024 (github.com)</a:t>
+            </a:r>
+            <a:endParaRPr lang="en-US" sz="2800" b="1" dirty="0"/>
+          </a:p>
+        </p:txBody>
+      </p:sp>
     </p:spTree>
     <p:extLst>
       <p:ext uri="{BB962C8B-B14F-4D97-AF65-F5344CB8AC3E}">
-        <p14:creationId xmlns:p14="http://schemas.microsoft.com/office/powerpoint/2010/main" val="1212003208"/>
+        <p14:creationId xmlns:p14="http://schemas.microsoft.com/office/powerpoint/2010/main" val="1160390494"/>
       </p:ext>
     </p:extLst>
   </p:cSld>
@@ -4448,10 +4103,10 @@
       </p:grpSpPr>
       <p:pic>
         <p:nvPicPr>
-          <p:cNvPr id="2" name="Picture 1">
-            <a:extLst>
-              <a:ext uri="{FF2B5EF4-FFF2-40B4-BE49-F238E27FC236}">
-                <a16:creationId xmlns:a16="http://schemas.microsoft.com/office/drawing/2014/main" id="{BE094549-4020-7361-6B38-7C6B8DEA3376}"/>
+          <p:cNvPr id="7" name="Picture 6">
+            <a:extLst>
+              <a:ext uri="{FF2B5EF4-FFF2-40B4-BE49-F238E27FC236}">
+                <a16:creationId xmlns:a16="http://schemas.microsoft.com/office/drawing/2014/main" id="{7E82C991-B79E-F258-C9F0-8674C6EFA476}"/>
               </a:ext>
             </a:extLst>
           </p:cNvPr>
@@ -4468,8 +4123,8 @@
         </p:blipFill>
         <p:spPr>
           <a:xfrm>
-            <a:off x="136372" y="0"/>
-            <a:ext cx="2476942" cy="6858000"/>
+            <a:off x="292142" y="0"/>
+            <a:ext cx="2330950" cy="6858000"/>
           </a:xfrm>
           <a:prstGeom prst="rect">
             <a:avLst/>
@@ -4478,10 +4133,10 @@
       </p:pic>
       <p:pic>
         <p:nvPicPr>
-          <p:cNvPr id="8" name="Picture 7">
-            <a:extLst>
-              <a:ext uri="{FF2B5EF4-FFF2-40B4-BE49-F238E27FC236}">
-                <a16:creationId xmlns:a16="http://schemas.microsoft.com/office/drawing/2014/main" id="{3AE580B3-E24C-0633-3362-06F421215215}"/>
+          <p:cNvPr id="3" name="Picture 2">
+            <a:extLst>
+              <a:ext uri="{FF2B5EF4-FFF2-40B4-BE49-F238E27FC236}">
+                <a16:creationId xmlns:a16="http://schemas.microsoft.com/office/drawing/2014/main" id="{BFE4ACC3-B34F-5CF7-D093-CE6A5BC2B438}"/>
               </a:ext>
             </a:extLst>
           </p:cNvPr>
@@ -4498,196 +4153,8 @@
         </p:blipFill>
         <p:spPr>
           <a:xfrm>
-            <a:off x="2751787" y="158444"/>
-            <a:ext cx="4007602" cy="3155446"/>
-          </a:xfrm>
-          <a:prstGeom prst="rect">
-            <a:avLst/>
-          </a:prstGeom>
-        </p:spPr>
-      </p:pic>
-      <p:pic>
-        <p:nvPicPr>
-          <p:cNvPr id="10" name="Picture 9">
-            <a:extLst>
-              <a:ext uri="{FF2B5EF4-FFF2-40B4-BE49-F238E27FC236}">
-                <a16:creationId xmlns:a16="http://schemas.microsoft.com/office/drawing/2014/main" id="{E63F9A6A-FDD3-7930-F0C0-AF7FE27F804F}"/>
-              </a:ext>
-            </a:extLst>
-          </p:cNvPr>
-          <p:cNvPicPr>
-            <a:picLocks noChangeAspect="1"/>
-          </p:cNvPicPr>
-          <p:nvPr/>
-        </p:nvPicPr>
-        <p:blipFill>
-          <a:blip r:embed="rId4"/>
-          <a:stretch>
-            <a:fillRect/>
-          </a:stretch>
-        </p:blipFill>
-        <p:spPr>
-          <a:xfrm>
-            <a:off x="7030996" y="427640"/>
-            <a:ext cx="4818434" cy="2247759"/>
-          </a:xfrm>
-          <a:prstGeom prst="rect">
-            <a:avLst/>
-          </a:prstGeom>
-        </p:spPr>
-      </p:pic>
-      <p:pic>
-        <p:nvPicPr>
-          <p:cNvPr id="12" name="Picture 11">
-            <a:extLst>
-              <a:ext uri="{FF2B5EF4-FFF2-40B4-BE49-F238E27FC236}">
-                <a16:creationId xmlns:a16="http://schemas.microsoft.com/office/drawing/2014/main" id="{6D746C1D-6F75-E112-50EA-CD99D6CE7986}"/>
-              </a:ext>
-            </a:extLst>
-          </p:cNvPr>
-          <p:cNvPicPr>
-            <a:picLocks noChangeAspect="1"/>
-          </p:cNvPicPr>
-          <p:nvPr/>
-        </p:nvPicPr>
-        <p:blipFill>
-          <a:blip r:embed="rId5"/>
-          <a:stretch>
-            <a:fillRect/>
-          </a:stretch>
-        </p:blipFill>
-        <p:spPr>
-          <a:xfrm>
-            <a:off x="2807309" y="3423655"/>
-            <a:ext cx="7682131" cy="2688746"/>
-          </a:xfrm>
-          <a:prstGeom prst="rect">
-            <a:avLst/>
-          </a:prstGeom>
-        </p:spPr>
-      </p:pic>
-      <p:sp>
-        <p:nvSpPr>
-          <p:cNvPr id="13" name="Rectangle 12">
-            <a:extLst>
-              <a:ext uri="{FF2B5EF4-FFF2-40B4-BE49-F238E27FC236}">
-                <a16:creationId xmlns:a16="http://schemas.microsoft.com/office/drawing/2014/main" id="{4BD26F7D-67E1-0BD1-A996-D955B28F1B95}"/>
-              </a:ext>
-            </a:extLst>
-          </p:cNvPr>
-          <p:cNvSpPr/>
-          <p:nvPr/>
-        </p:nvSpPr>
-        <p:spPr>
-          <a:xfrm>
-            <a:off x="11038883" y="3576536"/>
-            <a:ext cx="352660" cy="1744493"/>
-          </a:xfrm>
-          <a:prstGeom prst="rect">
-            <a:avLst/>
-          </a:prstGeom>
-          <a:solidFill>
-            <a:srgbClr val="FF0000"/>
-          </a:solidFill>
-        </p:spPr>
-        <p:style>
-          <a:lnRef idx="2">
-            <a:schemeClr val="accent1">
-              <a:shade val="15000"/>
-            </a:schemeClr>
-          </a:lnRef>
-          <a:fillRef idx="1">
-            <a:schemeClr val="accent1"/>
-          </a:fillRef>
-          <a:effectRef idx="0">
-            <a:schemeClr val="accent1"/>
-          </a:effectRef>
-          <a:fontRef idx="minor">
-            <a:schemeClr val="lt1"/>
-          </a:fontRef>
-        </p:style>
-        <p:txBody>
-          <a:bodyPr rtlCol="0" anchor="ctr"/>
-          <a:lstStyle/>
-          <a:p>
-            <a:pPr algn="ctr"/>
-            <a:endParaRPr lang="en-US"/>
-          </a:p>
-        </p:txBody>
-      </p:sp>
-      <p:sp>
-        <p:nvSpPr>
-          <p:cNvPr id="14" name="Oval 13">
-            <a:extLst>
-              <a:ext uri="{FF2B5EF4-FFF2-40B4-BE49-F238E27FC236}">
-                <a16:creationId xmlns:a16="http://schemas.microsoft.com/office/drawing/2014/main" id="{5A03AAE1-E862-3355-870D-EB361A96CD75}"/>
-              </a:ext>
-            </a:extLst>
-          </p:cNvPr>
-          <p:cNvSpPr/>
-          <p:nvPr/>
-        </p:nvSpPr>
-        <p:spPr>
-          <a:xfrm>
-            <a:off x="11038883" y="5583676"/>
-            <a:ext cx="466928" cy="479897"/>
-          </a:xfrm>
-          <a:prstGeom prst="ellipse">
-            <a:avLst/>
-          </a:prstGeom>
-          <a:solidFill>
-            <a:srgbClr val="FF0000"/>
-          </a:solidFill>
-        </p:spPr>
-        <p:style>
-          <a:lnRef idx="2">
-            <a:schemeClr val="accent1">
-              <a:shade val="15000"/>
-            </a:schemeClr>
-          </a:lnRef>
-          <a:fillRef idx="1">
-            <a:schemeClr val="accent1"/>
-          </a:fillRef>
-          <a:effectRef idx="0">
-            <a:schemeClr val="accent1"/>
-          </a:effectRef>
-          <a:fontRef idx="minor">
-            <a:schemeClr val="lt1"/>
-          </a:fontRef>
-        </p:style>
-        <p:txBody>
-          <a:bodyPr rtlCol="0" anchor="ctr"/>
-          <a:lstStyle/>
-          <a:p>
-            <a:pPr algn="ctr"/>
-            <a:endParaRPr lang="en-US"/>
-          </a:p>
-        </p:txBody>
-      </p:sp>
-      <p:pic>
-        <p:nvPicPr>
-          <p:cNvPr id="16" name="Picture 15">
-            <a:extLst>
-              <a:ext uri="{FF2B5EF4-FFF2-40B4-BE49-F238E27FC236}">
-                <a16:creationId xmlns:a16="http://schemas.microsoft.com/office/drawing/2014/main" id="{6A7901B2-6EEC-82E8-3526-4B61BC71192A}"/>
-              </a:ext>
-            </a:extLst>
-          </p:cNvPr>
-          <p:cNvPicPr>
-            <a:picLocks noChangeAspect="1"/>
-          </p:cNvPicPr>
-          <p:nvPr/>
-        </p:nvPicPr>
-        <p:blipFill>
-          <a:blip r:embed="rId6"/>
-          <a:stretch>
-            <a:fillRect/>
-          </a:stretch>
-        </p:blipFill>
-        <p:spPr>
-          <a:xfrm>
-            <a:off x="2931230" y="6222166"/>
-            <a:ext cx="7821116" cy="533474"/>
+            <a:off x="3471010" y="778212"/>
+            <a:ext cx="7226624" cy="5612859"/>
           </a:xfrm>
           <a:prstGeom prst="rect">
             <a:avLst/>
@@ -4697,7 +4164,7 @@
     </p:spTree>
     <p:extLst>
       <p:ext uri="{BB962C8B-B14F-4D97-AF65-F5344CB8AC3E}">
-        <p14:creationId xmlns:p14="http://schemas.microsoft.com/office/powerpoint/2010/main" val="2810513166"/>
+        <p14:creationId xmlns:p14="http://schemas.microsoft.com/office/powerpoint/2010/main" val="373630565"/>
       </p:ext>
     </p:extLst>
   </p:cSld>
@@ -4778,10 +4245,10 @@
       </p:pic>
       <p:pic>
         <p:nvPicPr>
-          <p:cNvPr id="6" name="Picture 5">
-            <a:extLst>
-              <a:ext uri="{FF2B5EF4-FFF2-40B4-BE49-F238E27FC236}">
-                <a16:creationId xmlns:a16="http://schemas.microsoft.com/office/drawing/2014/main" id="{92F752C7-05C3-6181-06F1-A4C253FC173E}"/>
+          <p:cNvPr id="8" name="Picture 7">
+            <a:extLst>
+              <a:ext uri="{FF2B5EF4-FFF2-40B4-BE49-F238E27FC236}">
+                <a16:creationId xmlns:a16="http://schemas.microsoft.com/office/drawing/2014/main" id="{3AE580B3-E24C-0633-3362-06F421215215}"/>
               </a:ext>
             </a:extLst>
           </p:cNvPr>
@@ -4798,8 +4265,8 @@
         </p:blipFill>
         <p:spPr>
           <a:xfrm>
-            <a:off x="2838672" y="467934"/>
-            <a:ext cx="8421275" cy="2915057"/>
+            <a:off x="2751787" y="158444"/>
+            <a:ext cx="4007602" cy="3155446"/>
           </a:xfrm>
           <a:prstGeom prst="rect">
             <a:avLst/>
@@ -4808,10 +4275,10 @@
       </p:pic>
       <p:pic>
         <p:nvPicPr>
-          <p:cNvPr id="9" name="Picture 8">
-            <a:extLst>
-              <a:ext uri="{FF2B5EF4-FFF2-40B4-BE49-F238E27FC236}">
-                <a16:creationId xmlns:a16="http://schemas.microsoft.com/office/drawing/2014/main" id="{4B24EB87-BC76-A4F8-5B51-E2F799518938}"/>
+          <p:cNvPr id="10" name="Picture 9">
+            <a:extLst>
+              <a:ext uri="{FF2B5EF4-FFF2-40B4-BE49-F238E27FC236}">
+                <a16:creationId xmlns:a16="http://schemas.microsoft.com/office/drawing/2014/main" id="{E63F9A6A-FDD3-7930-F0C0-AF7FE27F804F}"/>
               </a:ext>
             </a:extLst>
           </p:cNvPr>
@@ -4828,8 +4295,38 @@
         </p:blipFill>
         <p:spPr>
           <a:xfrm>
-            <a:off x="2781959" y="3475009"/>
-            <a:ext cx="7691487" cy="3266122"/>
+            <a:off x="7030996" y="427640"/>
+            <a:ext cx="4818434" cy="2247759"/>
+          </a:xfrm>
+          <a:prstGeom prst="rect">
+            <a:avLst/>
+          </a:prstGeom>
+        </p:spPr>
+      </p:pic>
+      <p:pic>
+        <p:nvPicPr>
+          <p:cNvPr id="12" name="Picture 11">
+            <a:extLst>
+              <a:ext uri="{FF2B5EF4-FFF2-40B4-BE49-F238E27FC236}">
+                <a16:creationId xmlns:a16="http://schemas.microsoft.com/office/drawing/2014/main" id="{6D746C1D-6F75-E112-50EA-CD99D6CE7986}"/>
+              </a:ext>
+            </a:extLst>
+          </p:cNvPr>
+          <p:cNvPicPr>
+            <a:picLocks noChangeAspect="1"/>
+          </p:cNvPicPr>
+          <p:nvPr/>
+        </p:nvPicPr>
+        <p:blipFill>
+          <a:blip r:embed="rId5"/>
+          <a:stretch>
+            <a:fillRect/>
+          </a:stretch>
+        </p:blipFill>
+        <p:spPr>
+          <a:xfrm>
+            <a:off x="2807309" y="3423655"/>
+            <a:ext cx="7682131" cy="2688746"/>
           </a:xfrm>
           <a:prstGeom prst="rect">
             <a:avLst/>
@@ -4838,11 +4335,10 @@
       </p:pic>
       <p:sp>
         <p:nvSpPr>
-          <p:cNvPr id="11" name="Action Button: Help 10">
-            <a:hlinkClick r:id="" action="ppaction://noaction" highlightClick="1"/>
-            <a:extLst>
-              <a:ext uri="{FF2B5EF4-FFF2-40B4-BE49-F238E27FC236}">
-                <a16:creationId xmlns:a16="http://schemas.microsoft.com/office/drawing/2014/main" id="{74A05506-EB6F-5A6D-D301-3608C5B2AF81}"/>
+          <p:cNvPr id="13" name="Rectangle 12">
+            <a:extLst>
+              <a:ext uri="{FF2B5EF4-FFF2-40B4-BE49-F238E27FC236}">
+                <a16:creationId xmlns:a16="http://schemas.microsoft.com/office/drawing/2014/main" id="{4BD26F7D-67E1-0BD1-A996-D955B28F1B95}"/>
               </a:ext>
             </a:extLst>
           </p:cNvPr>
@@ -4851,33 +4347,30 @@
         </p:nvSpPr>
         <p:spPr>
           <a:xfrm>
-            <a:off x="9445709" y="4669276"/>
-            <a:ext cx="1848256" cy="1939047"/>
-          </a:xfrm>
-          <a:prstGeom prst="actionButtonHelp">
+            <a:off x="11038883" y="3576536"/>
+            <a:ext cx="352660" cy="1744493"/>
+          </a:xfrm>
+          <a:prstGeom prst="rect">
             <a:avLst/>
           </a:prstGeom>
           <a:solidFill>
             <a:srgbClr val="FF0000"/>
           </a:solidFill>
-          <a:ln>
-            <a:solidFill>
-              <a:schemeClr val="tx1"/>
-            </a:solidFill>
-          </a:ln>
         </p:spPr>
         <p:style>
           <a:lnRef idx="2">
-            <a:schemeClr val="dk1"/>
+            <a:schemeClr val="accent1">
+              <a:shade val="15000"/>
+            </a:schemeClr>
           </a:lnRef>
           <a:fillRef idx="1">
-            <a:schemeClr val="lt1"/>
+            <a:schemeClr val="accent1"/>
           </a:fillRef>
           <a:effectRef idx="0">
-            <a:schemeClr val="dk1"/>
+            <a:schemeClr val="accent1"/>
           </a:effectRef>
           <a:fontRef idx="minor">
-            <a:schemeClr val="dk1"/>
+            <a:schemeClr val="lt1"/>
           </a:fontRef>
         </p:style>
         <p:txBody>
@@ -4889,10 +4382,89 @@
           </a:p>
         </p:txBody>
       </p:sp>
+      <p:sp>
+        <p:nvSpPr>
+          <p:cNvPr id="14" name="Oval 13">
+            <a:extLst>
+              <a:ext uri="{FF2B5EF4-FFF2-40B4-BE49-F238E27FC236}">
+                <a16:creationId xmlns:a16="http://schemas.microsoft.com/office/drawing/2014/main" id="{5A03AAE1-E862-3355-870D-EB361A96CD75}"/>
+              </a:ext>
+            </a:extLst>
+          </p:cNvPr>
+          <p:cNvSpPr/>
+          <p:nvPr/>
+        </p:nvSpPr>
+        <p:spPr>
+          <a:xfrm>
+            <a:off x="11038883" y="5583676"/>
+            <a:ext cx="466928" cy="479897"/>
+          </a:xfrm>
+          <a:prstGeom prst="ellipse">
+            <a:avLst/>
+          </a:prstGeom>
+          <a:solidFill>
+            <a:srgbClr val="FF0000"/>
+          </a:solidFill>
+        </p:spPr>
+        <p:style>
+          <a:lnRef idx="2">
+            <a:schemeClr val="accent1">
+              <a:shade val="15000"/>
+            </a:schemeClr>
+          </a:lnRef>
+          <a:fillRef idx="1">
+            <a:schemeClr val="accent1"/>
+          </a:fillRef>
+          <a:effectRef idx="0">
+            <a:schemeClr val="accent1"/>
+          </a:effectRef>
+          <a:fontRef idx="minor">
+            <a:schemeClr val="lt1"/>
+          </a:fontRef>
+        </p:style>
+        <p:txBody>
+          <a:bodyPr rtlCol="0" anchor="ctr"/>
+          <a:lstStyle/>
+          <a:p>
+            <a:pPr algn="ctr"/>
+            <a:endParaRPr lang="en-US"/>
+          </a:p>
+        </p:txBody>
+      </p:sp>
+      <p:pic>
+        <p:nvPicPr>
+          <p:cNvPr id="16" name="Picture 15">
+            <a:extLst>
+              <a:ext uri="{FF2B5EF4-FFF2-40B4-BE49-F238E27FC236}">
+                <a16:creationId xmlns:a16="http://schemas.microsoft.com/office/drawing/2014/main" id="{6A7901B2-6EEC-82E8-3526-4B61BC71192A}"/>
+              </a:ext>
+            </a:extLst>
+          </p:cNvPr>
+          <p:cNvPicPr>
+            <a:picLocks noChangeAspect="1"/>
+          </p:cNvPicPr>
+          <p:nvPr/>
+        </p:nvPicPr>
+        <p:blipFill>
+          <a:blip r:embed="rId6"/>
+          <a:stretch>
+            <a:fillRect/>
+          </a:stretch>
+        </p:blipFill>
+        <p:spPr>
+          <a:xfrm>
+            <a:off x="2931230" y="6222166"/>
+            <a:ext cx="7821116" cy="533474"/>
+          </a:xfrm>
+          <a:prstGeom prst="rect">
+            <a:avLst/>
+          </a:prstGeom>
+        </p:spPr>
+      </p:pic>
     </p:spTree>
     <p:extLst>
       <p:ext uri="{BB962C8B-B14F-4D97-AF65-F5344CB8AC3E}">
-        <p14:creationId xmlns:p14="http://schemas.microsoft.com/office/powerpoint/2010/main" val="1883452983"/>
+        <p14:creationId xmlns:p14="http://schemas.microsoft.com/office/powerpoint/2010/main" val="2810513166"/>
       </p:ext>
     </p:extLst>
   </p:cSld>
@@ -4971,6 +4543,66 @@
           </a:prstGeom>
         </p:spPr>
       </p:pic>
+      <p:pic>
+        <p:nvPicPr>
+          <p:cNvPr id="6" name="Picture 5">
+            <a:extLst>
+              <a:ext uri="{FF2B5EF4-FFF2-40B4-BE49-F238E27FC236}">
+                <a16:creationId xmlns:a16="http://schemas.microsoft.com/office/drawing/2014/main" id="{92F752C7-05C3-6181-06F1-A4C253FC173E}"/>
+              </a:ext>
+            </a:extLst>
+          </p:cNvPr>
+          <p:cNvPicPr>
+            <a:picLocks noChangeAspect="1"/>
+          </p:cNvPicPr>
+          <p:nvPr/>
+        </p:nvPicPr>
+        <p:blipFill>
+          <a:blip r:embed="rId3"/>
+          <a:stretch>
+            <a:fillRect/>
+          </a:stretch>
+        </p:blipFill>
+        <p:spPr>
+          <a:xfrm>
+            <a:off x="2838672" y="467934"/>
+            <a:ext cx="8421275" cy="2915057"/>
+          </a:xfrm>
+          <a:prstGeom prst="rect">
+            <a:avLst/>
+          </a:prstGeom>
+        </p:spPr>
+      </p:pic>
+      <p:pic>
+        <p:nvPicPr>
+          <p:cNvPr id="9" name="Picture 8">
+            <a:extLst>
+              <a:ext uri="{FF2B5EF4-FFF2-40B4-BE49-F238E27FC236}">
+                <a16:creationId xmlns:a16="http://schemas.microsoft.com/office/drawing/2014/main" id="{4B24EB87-BC76-A4F8-5B51-E2F799518938}"/>
+              </a:ext>
+            </a:extLst>
+          </p:cNvPr>
+          <p:cNvPicPr>
+            <a:picLocks noChangeAspect="1"/>
+          </p:cNvPicPr>
+          <p:nvPr/>
+        </p:nvPicPr>
+        <p:blipFill>
+          <a:blip r:embed="rId4"/>
+          <a:stretch>
+            <a:fillRect/>
+          </a:stretch>
+        </p:blipFill>
+        <p:spPr>
+          <a:xfrm>
+            <a:off x="2781959" y="3475009"/>
+            <a:ext cx="7691487" cy="3266122"/>
+          </a:xfrm>
+          <a:prstGeom prst="rect">
+            <a:avLst/>
+          </a:prstGeom>
+        </p:spPr>
+      </p:pic>
       <p:sp>
         <p:nvSpPr>
           <p:cNvPr id="11" name="Action Button: Help 10">
@@ -5024,40 +4656,10 @@
           </a:p>
         </p:txBody>
       </p:sp>
-      <p:pic>
-        <p:nvPicPr>
-          <p:cNvPr id="4" name="Picture 3">
-            <a:extLst>
-              <a:ext uri="{FF2B5EF4-FFF2-40B4-BE49-F238E27FC236}">
-                <a16:creationId xmlns:a16="http://schemas.microsoft.com/office/drawing/2014/main" id="{299EC667-302C-F149-2F73-EF10E754FD9C}"/>
-              </a:ext>
-            </a:extLst>
-          </p:cNvPr>
-          <p:cNvPicPr>
-            <a:picLocks noChangeAspect="1"/>
-          </p:cNvPicPr>
-          <p:nvPr/>
-        </p:nvPicPr>
-        <p:blipFill>
-          <a:blip r:embed="rId3"/>
-          <a:stretch>
-            <a:fillRect/>
-          </a:stretch>
-        </p:blipFill>
-        <p:spPr>
-          <a:xfrm>
-            <a:off x="3368714" y="380856"/>
-            <a:ext cx="5454572" cy="6096287"/>
-          </a:xfrm>
-          <a:prstGeom prst="rect">
-            <a:avLst/>
-          </a:prstGeom>
-        </p:spPr>
-      </p:pic>
     </p:spTree>
     <p:extLst>
       <p:ext uri="{BB962C8B-B14F-4D97-AF65-F5344CB8AC3E}">
-        <p14:creationId xmlns:p14="http://schemas.microsoft.com/office/powerpoint/2010/main" val="2371669658"/>
+        <p14:creationId xmlns:p14="http://schemas.microsoft.com/office/powerpoint/2010/main" val="1883452983"/>
       </p:ext>
     </p:extLst>
   </p:cSld>
@@ -5136,12 +4738,65 @@
           </a:prstGeom>
         </p:spPr>
       </p:pic>
+      <p:sp>
+        <p:nvSpPr>
+          <p:cNvPr id="11" name="Action Button: Help 10">
+            <a:hlinkClick r:id="" action="ppaction://noaction" highlightClick="1"/>
+            <a:extLst>
+              <a:ext uri="{FF2B5EF4-FFF2-40B4-BE49-F238E27FC236}">
+                <a16:creationId xmlns:a16="http://schemas.microsoft.com/office/drawing/2014/main" id="{74A05506-EB6F-5A6D-D301-3608C5B2AF81}"/>
+              </a:ext>
+            </a:extLst>
+          </p:cNvPr>
+          <p:cNvSpPr/>
+          <p:nvPr/>
+        </p:nvSpPr>
+        <p:spPr>
+          <a:xfrm>
+            <a:off x="9445709" y="4669276"/>
+            <a:ext cx="1848256" cy="1939047"/>
+          </a:xfrm>
+          <a:prstGeom prst="actionButtonHelp">
+            <a:avLst/>
+          </a:prstGeom>
+          <a:solidFill>
+            <a:srgbClr val="FF0000"/>
+          </a:solidFill>
+          <a:ln>
+            <a:solidFill>
+              <a:schemeClr val="tx1"/>
+            </a:solidFill>
+          </a:ln>
+        </p:spPr>
+        <p:style>
+          <a:lnRef idx="2">
+            <a:schemeClr val="dk1"/>
+          </a:lnRef>
+          <a:fillRef idx="1">
+            <a:schemeClr val="lt1"/>
+          </a:fillRef>
+          <a:effectRef idx="0">
+            <a:schemeClr val="dk1"/>
+          </a:effectRef>
+          <a:fontRef idx="minor">
+            <a:schemeClr val="dk1"/>
+          </a:fontRef>
+        </p:style>
+        <p:txBody>
+          <a:bodyPr rtlCol="0" anchor="ctr"/>
+          <a:lstStyle/>
+          <a:p>
+            <a:pPr algn="ctr"/>
+            <a:endParaRPr lang="en-US"/>
+          </a:p>
+        </p:txBody>
+      </p:sp>
       <p:pic>
         <p:nvPicPr>
-          <p:cNvPr id="5" name="Picture 4">
-            <a:extLst>
-              <a:ext uri="{FF2B5EF4-FFF2-40B4-BE49-F238E27FC236}">
-                <a16:creationId xmlns:a16="http://schemas.microsoft.com/office/drawing/2014/main" id="{268C6803-7834-EE59-00A4-604C141752E7}"/>
+          <p:cNvPr id="4" name="Picture 3">
+            <a:extLst>
+              <a:ext uri="{FF2B5EF4-FFF2-40B4-BE49-F238E27FC236}">
+                <a16:creationId xmlns:a16="http://schemas.microsoft.com/office/drawing/2014/main" id="{299EC667-302C-F149-2F73-EF10E754FD9C}"/>
               </a:ext>
             </a:extLst>
           </p:cNvPr>
@@ -5158,8 +4813,8 @@
         </p:blipFill>
         <p:spPr>
           <a:xfrm>
-            <a:off x="3447336" y="424774"/>
-            <a:ext cx="4013278" cy="6008451"/>
+            <a:off x="3368714" y="380856"/>
+            <a:ext cx="5454572" cy="6096287"/>
           </a:xfrm>
           <a:prstGeom prst="rect">
             <a:avLst/>
@@ -5169,7 +4824,7 @@
     </p:spTree>
     <p:extLst>
       <p:ext uri="{BB962C8B-B14F-4D97-AF65-F5344CB8AC3E}">
-        <p14:creationId xmlns:p14="http://schemas.microsoft.com/office/powerpoint/2010/main" val="980242563"/>
+        <p14:creationId xmlns:p14="http://schemas.microsoft.com/office/powerpoint/2010/main" val="2371669658"/>
       </p:ext>
     </p:extLst>
   </p:cSld>
@@ -5253,7 +4908,7 @@
           <p:cNvPr id="5" name="Picture 4">
             <a:extLst>
               <a:ext uri="{FF2B5EF4-FFF2-40B4-BE49-F238E27FC236}">
-                <a16:creationId xmlns:a16="http://schemas.microsoft.com/office/drawing/2014/main" id="{B7E4CC1A-9A4D-9FA2-AB02-6FFAD8A0D2F9}"/>
+                <a16:creationId xmlns:a16="http://schemas.microsoft.com/office/drawing/2014/main" id="{268C6803-7834-EE59-00A4-604C141752E7}"/>
               </a:ext>
             </a:extLst>
           </p:cNvPr>
@@ -5270,8 +4925,8 @@
         </p:blipFill>
         <p:spPr>
           <a:xfrm>
-            <a:off x="5512726" y="1372579"/>
-            <a:ext cx="3287563" cy="3687156"/>
+            <a:off x="3447336" y="424774"/>
+            <a:ext cx="4013278" cy="6008451"/>
           </a:xfrm>
           <a:prstGeom prst="rect">
             <a:avLst/>
@@ -5281,7 +4936,7 @@
     </p:spTree>
     <p:extLst>
       <p:ext uri="{BB962C8B-B14F-4D97-AF65-F5344CB8AC3E}">
-        <p14:creationId xmlns:p14="http://schemas.microsoft.com/office/powerpoint/2010/main" val="3332554992"/>
+        <p14:creationId xmlns:p14="http://schemas.microsoft.com/office/powerpoint/2010/main" val="980242563"/>
       </p:ext>
     </p:extLst>
   </p:cSld>
@@ -5332,10 +4987,10 @@
       </p:grpSpPr>
       <p:pic>
         <p:nvPicPr>
-          <p:cNvPr id="9" name="Picture 8">
-            <a:extLst>
-              <a:ext uri="{FF2B5EF4-FFF2-40B4-BE49-F238E27FC236}">
-                <a16:creationId xmlns:a16="http://schemas.microsoft.com/office/drawing/2014/main" id="{5F784874-5078-B49E-359F-3C8972B681D5}"/>
+          <p:cNvPr id="2" name="Picture 1">
+            <a:extLst>
+              <a:ext uri="{FF2B5EF4-FFF2-40B4-BE49-F238E27FC236}">
+                <a16:creationId xmlns:a16="http://schemas.microsoft.com/office/drawing/2014/main" id="{BE094549-4020-7361-6B38-7C6B8DEA3376}"/>
               </a:ext>
             </a:extLst>
           </p:cNvPr>
@@ -5352,63 +5007,20 @@
         </p:blipFill>
         <p:spPr>
           <a:xfrm>
-            <a:off x="1100769" y="202894"/>
-            <a:ext cx="7726545" cy="5504000"/>
+            <a:off x="136372" y="0"/>
+            <a:ext cx="2476942" cy="6858000"/>
           </a:xfrm>
           <a:prstGeom prst="rect">
             <a:avLst/>
           </a:prstGeom>
         </p:spPr>
       </p:pic>
-      <p:sp>
-        <p:nvSpPr>
-          <p:cNvPr id="10" name="TextBox 9">
-            <a:extLst>
-              <a:ext uri="{FF2B5EF4-FFF2-40B4-BE49-F238E27FC236}">
-                <a16:creationId xmlns:a16="http://schemas.microsoft.com/office/drawing/2014/main" id="{A439A853-A20A-1B40-8BA0-1E58836CD3EC}"/>
-              </a:ext>
-            </a:extLst>
-          </p:cNvPr>
-          <p:cNvSpPr txBox="1"/>
-          <p:nvPr/>
-        </p:nvSpPr>
-        <p:spPr>
-          <a:xfrm>
-            <a:off x="9358009" y="3268494"/>
-            <a:ext cx="2730230" cy="1815882"/>
-          </a:xfrm>
-          <a:prstGeom prst="rect">
-            <a:avLst/>
-          </a:prstGeom>
-          <a:noFill/>
-        </p:spPr>
-        <p:txBody>
-          <a:bodyPr wrap="square" rtlCol="0">
-            <a:spAutoFit/>
-          </a:bodyPr>
-          <a:lstStyle/>
-          <a:p>
-            <a:pPr algn="ctr"/>
-            <a:r>
-              <a:rPr lang="en-US" sz="2800" b="1" dirty="0"/>
-              <a:t>TODO:</a:t>
-            </a:r>
-          </a:p>
-          <a:p>
-            <a:pPr algn="ctr"/>
-            <a:r>
-              <a:rPr lang="en-US" sz="2800" b="1" dirty="0"/>
-              <a:t>Need to sort particles by energy </a:t>
-            </a:r>
-          </a:p>
-        </p:txBody>
-      </p:sp>
       <p:pic>
         <p:nvPicPr>
-          <p:cNvPr id="12" name="Picture 11">
-            <a:extLst>
-              <a:ext uri="{FF2B5EF4-FFF2-40B4-BE49-F238E27FC236}">
-                <a16:creationId xmlns:a16="http://schemas.microsoft.com/office/drawing/2014/main" id="{DD5DB697-107B-78B7-01CA-35276289B12E}"/>
+          <p:cNvPr id="5" name="Picture 4">
+            <a:extLst>
+              <a:ext uri="{FF2B5EF4-FFF2-40B4-BE49-F238E27FC236}">
+                <a16:creationId xmlns:a16="http://schemas.microsoft.com/office/drawing/2014/main" id="{B7E4CC1A-9A4D-9FA2-AB02-6FFAD8A0D2F9}"/>
               </a:ext>
             </a:extLst>
           </p:cNvPr>
@@ -5425,8 +5037,8 @@
         </p:blipFill>
         <p:spPr>
           <a:xfrm>
-            <a:off x="434502" y="6044605"/>
-            <a:ext cx="9442315" cy="432575"/>
+            <a:off x="5512726" y="1372579"/>
+            <a:ext cx="3287563" cy="3687156"/>
           </a:xfrm>
           <a:prstGeom prst="rect">
             <a:avLst/>
@@ -5436,7 +5048,7 @@
     </p:spTree>
     <p:extLst>
       <p:ext uri="{BB962C8B-B14F-4D97-AF65-F5344CB8AC3E}">
-        <p14:creationId xmlns:p14="http://schemas.microsoft.com/office/powerpoint/2010/main" val="1859006093"/>
+        <p14:creationId xmlns:p14="http://schemas.microsoft.com/office/powerpoint/2010/main" val="3332554992"/>
       </p:ext>
     </p:extLst>
   </p:cSld>
@@ -5487,10 +5099,10 @@
       </p:grpSpPr>
       <p:pic>
         <p:nvPicPr>
-          <p:cNvPr id="4" name="Picture 3">
-            <a:extLst>
-              <a:ext uri="{FF2B5EF4-FFF2-40B4-BE49-F238E27FC236}">
-                <a16:creationId xmlns:a16="http://schemas.microsoft.com/office/drawing/2014/main" id="{101ABD8E-B446-F3FB-CE2D-9177646F2E9D}"/>
+          <p:cNvPr id="9" name="Picture 8">
+            <a:extLst>
+              <a:ext uri="{FF2B5EF4-FFF2-40B4-BE49-F238E27FC236}">
+                <a16:creationId xmlns:a16="http://schemas.microsoft.com/office/drawing/2014/main" id="{5F784874-5078-B49E-359F-3C8972B681D5}"/>
               </a:ext>
             </a:extLst>
           </p:cNvPr>
@@ -5507,8 +5119,8 @@
         </p:blipFill>
         <p:spPr>
           <a:xfrm>
-            <a:off x="277468" y="426738"/>
-            <a:ext cx="11222016" cy="2333951"/>
+            <a:off x="1100769" y="202894"/>
+            <a:ext cx="7726545" cy="5504000"/>
           </a:xfrm>
           <a:prstGeom prst="rect">
             <a:avLst/>
@@ -5517,63 +5129,53 @@
       </p:pic>
       <p:sp>
         <p:nvSpPr>
-          <p:cNvPr id="6" name="Action Button: Help 5">
-            <a:hlinkClick r:id="" action="ppaction://noaction" highlightClick="1"/>
-            <a:extLst>
-              <a:ext uri="{FF2B5EF4-FFF2-40B4-BE49-F238E27FC236}">
-                <a16:creationId xmlns:a16="http://schemas.microsoft.com/office/drawing/2014/main" id="{8E8ABADF-F0E1-EFE0-B0EA-81B133B408F6}"/>
-              </a:ext>
-            </a:extLst>
-          </p:cNvPr>
-          <p:cNvSpPr/>
+          <p:cNvPr id="10" name="TextBox 9">
+            <a:extLst>
+              <a:ext uri="{FF2B5EF4-FFF2-40B4-BE49-F238E27FC236}">
+                <a16:creationId xmlns:a16="http://schemas.microsoft.com/office/drawing/2014/main" id="{A439A853-A20A-1B40-8BA0-1E58836CD3EC}"/>
+              </a:ext>
+            </a:extLst>
+          </p:cNvPr>
+          <p:cNvSpPr txBox="1"/>
           <p:nvPr/>
         </p:nvSpPr>
         <p:spPr>
           <a:xfrm>
-            <a:off x="9069571" y="4182892"/>
-            <a:ext cx="1848256" cy="1939047"/>
-          </a:xfrm>
-          <a:prstGeom prst="actionButtonHelp">
-            <a:avLst/>
-          </a:prstGeom>
-          <a:solidFill>
-            <a:srgbClr val="FF0000"/>
-          </a:solidFill>
-          <a:ln>
-            <a:solidFill>
-              <a:schemeClr val="tx1"/>
-            </a:solidFill>
-          </a:ln>
-        </p:spPr>
-        <p:style>
-          <a:lnRef idx="2">
-            <a:schemeClr val="dk1"/>
-          </a:lnRef>
-          <a:fillRef idx="1">
-            <a:schemeClr val="lt1"/>
-          </a:fillRef>
-          <a:effectRef idx="0">
-            <a:schemeClr val="dk1"/>
-          </a:effectRef>
-          <a:fontRef idx="minor">
-            <a:schemeClr val="dk1"/>
-          </a:fontRef>
-        </p:style>
+            <a:off x="9358009" y="3268494"/>
+            <a:ext cx="2730230" cy="1815882"/>
+          </a:xfrm>
+          <a:prstGeom prst="rect">
+            <a:avLst/>
+          </a:prstGeom>
+          <a:noFill/>
+        </p:spPr>
         <p:txBody>
-          <a:bodyPr rtlCol="0" anchor="ctr"/>
+          <a:bodyPr wrap="square" rtlCol="0">
+            <a:spAutoFit/>
+          </a:bodyPr>
           <a:lstStyle/>
           <a:p>
             <a:pPr algn="ctr"/>
-            <a:endParaRPr lang="en-US"/>
+            <a:r>
+              <a:rPr lang="en-US" sz="2800" b="1" dirty="0"/>
+              <a:t>TODO:</a:t>
+            </a:r>
+          </a:p>
+          <a:p>
+            <a:pPr algn="ctr"/>
+            <a:r>
+              <a:rPr lang="en-US" sz="2800" b="1" dirty="0"/>
+              <a:t>Need to sort particles by energy </a:t>
+            </a:r>
           </a:p>
         </p:txBody>
       </p:sp>
       <p:pic>
         <p:nvPicPr>
-          <p:cNvPr id="8" name="Picture 7">
-            <a:extLst>
-              <a:ext uri="{FF2B5EF4-FFF2-40B4-BE49-F238E27FC236}">
-                <a16:creationId xmlns:a16="http://schemas.microsoft.com/office/drawing/2014/main" id="{FB9C6C84-54B4-FC5E-3E6D-B7978F45CB1A}"/>
+          <p:cNvPr id="12" name="Picture 11">
+            <a:extLst>
+              <a:ext uri="{FF2B5EF4-FFF2-40B4-BE49-F238E27FC236}">
+                <a16:creationId xmlns:a16="http://schemas.microsoft.com/office/drawing/2014/main" id="{DD5DB697-107B-78B7-01CA-35276289B12E}"/>
               </a:ext>
             </a:extLst>
           </p:cNvPr>
@@ -5590,8 +5192,8 @@
         </p:blipFill>
         <p:spPr>
           <a:xfrm>
-            <a:off x="2395200" y="2897128"/>
-            <a:ext cx="4978365" cy="3775210"/>
+            <a:off x="434502" y="6044605"/>
+            <a:ext cx="9442315" cy="432575"/>
           </a:xfrm>
           <a:prstGeom prst="rect">
             <a:avLst/>
@@ -5601,7 +5203,7 @@
     </p:spTree>
     <p:extLst>
       <p:ext uri="{BB962C8B-B14F-4D97-AF65-F5344CB8AC3E}">
-        <p14:creationId xmlns:p14="http://schemas.microsoft.com/office/powerpoint/2010/main" val="3948580414"/>
+        <p14:creationId xmlns:p14="http://schemas.microsoft.com/office/powerpoint/2010/main" val="1859006093"/>
       </p:ext>
     </p:extLst>
   </p:cSld>
@@ -5652,10 +5254,10 @@
       </p:grpSpPr>
       <p:pic>
         <p:nvPicPr>
-          <p:cNvPr id="3" name="Picture 2">
-            <a:extLst>
-              <a:ext uri="{FF2B5EF4-FFF2-40B4-BE49-F238E27FC236}">
-                <a16:creationId xmlns:a16="http://schemas.microsoft.com/office/drawing/2014/main" id="{8CCCAC44-3B61-E1E1-04EA-C8EF185F5A47}"/>
+          <p:cNvPr id="4" name="Picture 3">
+            <a:extLst>
+              <a:ext uri="{FF2B5EF4-FFF2-40B4-BE49-F238E27FC236}">
+                <a16:creationId xmlns:a16="http://schemas.microsoft.com/office/drawing/2014/main" id="{101ABD8E-B446-F3FB-CE2D-9177646F2E9D}"/>
               </a:ext>
             </a:extLst>
           </p:cNvPr>
@@ -5672,158 +5274,8 @@
         </p:blipFill>
         <p:spPr>
           <a:xfrm>
-            <a:off x="237218" y="388831"/>
-            <a:ext cx="5166934" cy="945695"/>
-          </a:xfrm>
-          <a:prstGeom prst="rect">
-            <a:avLst/>
-          </a:prstGeom>
-        </p:spPr>
-      </p:pic>
-      <p:pic>
-        <p:nvPicPr>
-          <p:cNvPr id="10" name="Picture 9">
-            <a:extLst>
-              <a:ext uri="{FF2B5EF4-FFF2-40B4-BE49-F238E27FC236}">
-                <a16:creationId xmlns:a16="http://schemas.microsoft.com/office/drawing/2014/main" id="{64604C68-5457-BFBE-6CF0-B24E1C599E4E}"/>
-              </a:ext>
-            </a:extLst>
-          </p:cNvPr>
-          <p:cNvPicPr>
-            <a:picLocks noChangeAspect="1"/>
-          </p:cNvPicPr>
-          <p:nvPr/>
-        </p:nvPicPr>
-        <p:blipFill>
-          <a:blip r:embed="rId3"/>
-          <a:stretch>
-            <a:fillRect/>
-          </a:stretch>
-        </p:blipFill>
-        <p:spPr>
-          <a:xfrm>
-            <a:off x="5603919" y="388831"/>
-            <a:ext cx="6203095" cy="859398"/>
-          </a:xfrm>
-          <a:prstGeom prst="rect">
-            <a:avLst/>
-          </a:prstGeom>
-        </p:spPr>
-      </p:pic>
-      <p:pic>
-        <p:nvPicPr>
-          <p:cNvPr id="12" name="Picture 11">
-            <a:extLst>
-              <a:ext uri="{FF2B5EF4-FFF2-40B4-BE49-F238E27FC236}">
-                <a16:creationId xmlns:a16="http://schemas.microsoft.com/office/drawing/2014/main" id="{A1FF4ADC-D0F3-14FF-DEC2-B2D911E037A0}"/>
-              </a:ext>
-            </a:extLst>
-          </p:cNvPr>
-          <p:cNvPicPr>
-            <a:picLocks noChangeAspect="1"/>
-          </p:cNvPicPr>
-          <p:nvPr/>
-        </p:nvPicPr>
-        <p:blipFill>
-          <a:blip r:embed="rId4"/>
-          <a:stretch>
-            <a:fillRect/>
-          </a:stretch>
-        </p:blipFill>
-        <p:spPr>
-          <a:xfrm>
-            <a:off x="314375" y="1763672"/>
-            <a:ext cx="3887273" cy="2568726"/>
-          </a:xfrm>
-          <a:prstGeom prst="rect">
-            <a:avLst/>
-          </a:prstGeom>
-        </p:spPr>
-      </p:pic>
-      <p:pic>
-        <p:nvPicPr>
-          <p:cNvPr id="14" name="Picture 13">
-            <a:extLst>
-              <a:ext uri="{FF2B5EF4-FFF2-40B4-BE49-F238E27FC236}">
-                <a16:creationId xmlns:a16="http://schemas.microsoft.com/office/drawing/2014/main" id="{854299F7-EE12-AB0F-62EE-0F15829E1188}"/>
-              </a:ext>
-            </a:extLst>
-          </p:cNvPr>
-          <p:cNvPicPr>
-            <a:picLocks noChangeAspect="1"/>
-          </p:cNvPicPr>
-          <p:nvPr/>
-        </p:nvPicPr>
-        <p:blipFill>
-          <a:blip r:embed="rId5"/>
-          <a:stretch>
-            <a:fillRect/>
-          </a:stretch>
-        </p:blipFill>
-        <p:spPr>
-          <a:xfrm>
-            <a:off x="1607004" y="4574072"/>
-            <a:ext cx="7203329" cy="990148"/>
-          </a:xfrm>
-          <a:prstGeom prst="rect">
-            <a:avLst/>
-          </a:prstGeom>
-        </p:spPr>
-      </p:pic>
-      <p:pic>
-        <p:nvPicPr>
-          <p:cNvPr id="4" name="Picture 3">
-            <a:extLst>
-              <a:ext uri="{FF2B5EF4-FFF2-40B4-BE49-F238E27FC236}">
-                <a16:creationId xmlns:a16="http://schemas.microsoft.com/office/drawing/2014/main" id="{08DE7FBF-649A-62A7-D105-6D6A66CEF5C6}"/>
-              </a:ext>
-            </a:extLst>
-          </p:cNvPr>
-          <p:cNvPicPr>
-            <a:picLocks noChangeAspect="1"/>
-          </p:cNvPicPr>
-          <p:nvPr/>
-        </p:nvPicPr>
-        <p:blipFill>
-          <a:blip r:embed="rId6"/>
-          <a:stretch>
-            <a:fillRect/>
-          </a:stretch>
-        </p:blipFill>
-        <p:spPr>
-          <a:xfrm>
-            <a:off x="4393093" y="2037226"/>
-            <a:ext cx="7106744" cy="1630050"/>
-          </a:xfrm>
-          <a:prstGeom prst="rect">
-            <a:avLst/>
-          </a:prstGeom>
-        </p:spPr>
-      </p:pic>
-      <p:pic>
-        <p:nvPicPr>
-          <p:cNvPr id="15" name="Picture 14">
-            <a:extLst>
-              <a:ext uri="{FF2B5EF4-FFF2-40B4-BE49-F238E27FC236}">
-                <a16:creationId xmlns:a16="http://schemas.microsoft.com/office/drawing/2014/main" id="{E1B76A13-B545-8719-86CE-83F660CC77D1}"/>
-              </a:ext>
-            </a:extLst>
-          </p:cNvPr>
-          <p:cNvPicPr>
-            <a:picLocks noChangeAspect="1"/>
-          </p:cNvPicPr>
-          <p:nvPr/>
-        </p:nvPicPr>
-        <p:blipFill>
-          <a:blip r:embed="rId7"/>
-          <a:stretch>
-            <a:fillRect/>
-          </a:stretch>
-        </p:blipFill>
-        <p:spPr>
-          <a:xfrm>
-            <a:off x="1607004" y="5695815"/>
-            <a:ext cx="7416044" cy="1097345"/>
+            <a:off x="277468" y="426738"/>
+            <a:ext cx="11222016" cy="2333951"/>
           </a:xfrm>
           <a:prstGeom prst="rect">
             <a:avLst/>
@@ -5832,11 +5284,11 @@
       </p:pic>
       <p:sp>
         <p:nvSpPr>
-          <p:cNvPr id="16" name="Action Button: Help 15">
+          <p:cNvPr id="6" name="Action Button: Help 5">
             <a:hlinkClick r:id="" action="ppaction://noaction" highlightClick="1"/>
             <a:extLst>
               <a:ext uri="{FF2B5EF4-FFF2-40B4-BE49-F238E27FC236}">
-                <a16:creationId xmlns:a16="http://schemas.microsoft.com/office/drawing/2014/main" id="{B9DCE39A-3787-FA76-D3D9-6A979FCB8CE7}"/>
+                <a16:creationId xmlns:a16="http://schemas.microsoft.com/office/drawing/2014/main" id="{8E8ABADF-F0E1-EFE0-B0EA-81B133B408F6}"/>
               </a:ext>
             </a:extLst>
           </p:cNvPr>
@@ -5845,7 +5297,7 @@
         </p:nvSpPr>
         <p:spPr>
           <a:xfrm>
-            <a:off x="9660868" y="4305441"/>
+            <a:off x="9069571" y="4182892"/>
             <a:ext cx="1848256" cy="1939047"/>
           </a:xfrm>
           <a:prstGeom prst="actionButtonHelp">
@@ -5883,10 +5335,40 @@
           </a:p>
         </p:txBody>
       </p:sp>
+      <p:pic>
+        <p:nvPicPr>
+          <p:cNvPr id="8" name="Picture 7">
+            <a:extLst>
+              <a:ext uri="{FF2B5EF4-FFF2-40B4-BE49-F238E27FC236}">
+                <a16:creationId xmlns:a16="http://schemas.microsoft.com/office/drawing/2014/main" id="{FB9C6C84-54B4-FC5E-3E6D-B7978F45CB1A}"/>
+              </a:ext>
+            </a:extLst>
+          </p:cNvPr>
+          <p:cNvPicPr>
+            <a:picLocks noChangeAspect="1"/>
+          </p:cNvPicPr>
+          <p:nvPr/>
+        </p:nvPicPr>
+        <p:blipFill>
+          <a:blip r:embed="rId3"/>
+          <a:stretch>
+            <a:fillRect/>
+          </a:stretch>
+        </p:blipFill>
+        <p:spPr>
+          <a:xfrm>
+            <a:off x="2395200" y="2897128"/>
+            <a:ext cx="4978365" cy="3775210"/>
+          </a:xfrm>
+          <a:prstGeom prst="rect">
+            <a:avLst/>
+          </a:prstGeom>
+        </p:spPr>
+      </p:pic>
     </p:spTree>
     <p:extLst>
       <p:ext uri="{BB962C8B-B14F-4D97-AF65-F5344CB8AC3E}">
-        <p14:creationId xmlns:p14="http://schemas.microsoft.com/office/powerpoint/2010/main" val="1637514587"/>
+        <p14:creationId xmlns:p14="http://schemas.microsoft.com/office/powerpoint/2010/main" val="3948580414"/>
       </p:ext>
     </p:extLst>
   </p:cSld>
@@ -5937,10 +5419,10 @@
       </p:grpSpPr>
       <p:pic>
         <p:nvPicPr>
-          <p:cNvPr id="13" name="Picture 12">
-            <a:extLst>
-              <a:ext uri="{FF2B5EF4-FFF2-40B4-BE49-F238E27FC236}">
-                <a16:creationId xmlns:a16="http://schemas.microsoft.com/office/drawing/2014/main" id="{AD52B74E-8FE0-AA43-EC3B-3D4216B574E4}"/>
+          <p:cNvPr id="3" name="Picture 2">
+            <a:extLst>
+              <a:ext uri="{FF2B5EF4-FFF2-40B4-BE49-F238E27FC236}">
+                <a16:creationId xmlns:a16="http://schemas.microsoft.com/office/drawing/2014/main" id="{8CCCAC44-3B61-E1E1-04EA-C8EF185F5A47}"/>
               </a:ext>
             </a:extLst>
           </p:cNvPr>
@@ -5957,8 +5439,8 @@
         </p:blipFill>
         <p:spPr>
           <a:xfrm>
-            <a:off x="196129" y="1125118"/>
-            <a:ext cx="6715065" cy="4527537"/>
+            <a:off x="237218" y="388831"/>
+            <a:ext cx="5166934" cy="945695"/>
           </a:xfrm>
           <a:prstGeom prst="rect">
             <a:avLst/>
@@ -5967,10 +5449,10 @@
       </p:pic>
       <p:pic>
         <p:nvPicPr>
-          <p:cNvPr id="2" name="Picture 1">
-            <a:extLst>
-              <a:ext uri="{FF2B5EF4-FFF2-40B4-BE49-F238E27FC236}">
-                <a16:creationId xmlns:a16="http://schemas.microsoft.com/office/drawing/2014/main" id="{B32F36EF-CE04-78A7-1864-9161F674EAED}"/>
+          <p:cNvPr id="10" name="Picture 9">
+            <a:extLst>
+              <a:ext uri="{FF2B5EF4-FFF2-40B4-BE49-F238E27FC236}">
+                <a16:creationId xmlns:a16="http://schemas.microsoft.com/office/drawing/2014/main" id="{64604C68-5457-BFBE-6CF0-B24E1C599E4E}"/>
               </a:ext>
             </a:extLst>
           </p:cNvPr>
@@ -5987,18 +5469,191 @@
         </p:blipFill>
         <p:spPr>
           <a:xfrm>
-            <a:off x="7084785" y="1125118"/>
-            <a:ext cx="4860586" cy="4527537"/>
+            <a:off x="5603919" y="388831"/>
+            <a:ext cx="6203095" cy="859398"/>
           </a:xfrm>
           <a:prstGeom prst="rect">
             <a:avLst/>
           </a:prstGeom>
         </p:spPr>
       </p:pic>
+      <p:pic>
+        <p:nvPicPr>
+          <p:cNvPr id="12" name="Picture 11">
+            <a:extLst>
+              <a:ext uri="{FF2B5EF4-FFF2-40B4-BE49-F238E27FC236}">
+                <a16:creationId xmlns:a16="http://schemas.microsoft.com/office/drawing/2014/main" id="{A1FF4ADC-D0F3-14FF-DEC2-B2D911E037A0}"/>
+              </a:ext>
+            </a:extLst>
+          </p:cNvPr>
+          <p:cNvPicPr>
+            <a:picLocks noChangeAspect="1"/>
+          </p:cNvPicPr>
+          <p:nvPr/>
+        </p:nvPicPr>
+        <p:blipFill>
+          <a:blip r:embed="rId4"/>
+          <a:stretch>
+            <a:fillRect/>
+          </a:stretch>
+        </p:blipFill>
+        <p:spPr>
+          <a:xfrm>
+            <a:off x="314375" y="1763672"/>
+            <a:ext cx="3887273" cy="2568726"/>
+          </a:xfrm>
+          <a:prstGeom prst="rect">
+            <a:avLst/>
+          </a:prstGeom>
+        </p:spPr>
+      </p:pic>
+      <p:pic>
+        <p:nvPicPr>
+          <p:cNvPr id="14" name="Picture 13">
+            <a:extLst>
+              <a:ext uri="{FF2B5EF4-FFF2-40B4-BE49-F238E27FC236}">
+                <a16:creationId xmlns:a16="http://schemas.microsoft.com/office/drawing/2014/main" id="{854299F7-EE12-AB0F-62EE-0F15829E1188}"/>
+              </a:ext>
+            </a:extLst>
+          </p:cNvPr>
+          <p:cNvPicPr>
+            <a:picLocks noChangeAspect="1"/>
+          </p:cNvPicPr>
+          <p:nvPr/>
+        </p:nvPicPr>
+        <p:blipFill>
+          <a:blip r:embed="rId5"/>
+          <a:stretch>
+            <a:fillRect/>
+          </a:stretch>
+        </p:blipFill>
+        <p:spPr>
+          <a:xfrm>
+            <a:off x="1607004" y="4574072"/>
+            <a:ext cx="7203329" cy="990148"/>
+          </a:xfrm>
+          <a:prstGeom prst="rect">
+            <a:avLst/>
+          </a:prstGeom>
+        </p:spPr>
+      </p:pic>
+      <p:pic>
+        <p:nvPicPr>
+          <p:cNvPr id="4" name="Picture 3">
+            <a:extLst>
+              <a:ext uri="{FF2B5EF4-FFF2-40B4-BE49-F238E27FC236}">
+                <a16:creationId xmlns:a16="http://schemas.microsoft.com/office/drawing/2014/main" id="{08DE7FBF-649A-62A7-D105-6D6A66CEF5C6}"/>
+              </a:ext>
+            </a:extLst>
+          </p:cNvPr>
+          <p:cNvPicPr>
+            <a:picLocks noChangeAspect="1"/>
+          </p:cNvPicPr>
+          <p:nvPr/>
+        </p:nvPicPr>
+        <p:blipFill>
+          <a:blip r:embed="rId6"/>
+          <a:stretch>
+            <a:fillRect/>
+          </a:stretch>
+        </p:blipFill>
+        <p:spPr>
+          <a:xfrm>
+            <a:off x="4393093" y="2037226"/>
+            <a:ext cx="7106744" cy="1630050"/>
+          </a:xfrm>
+          <a:prstGeom prst="rect">
+            <a:avLst/>
+          </a:prstGeom>
+        </p:spPr>
+      </p:pic>
+      <p:pic>
+        <p:nvPicPr>
+          <p:cNvPr id="15" name="Picture 14">
+            <a:extLst>
+              <a:ext uri="{FF2B5EF4-FFF2-40B4-BE49-F238E27FC236}">
+                <a16:creationId xmlns:a16="http://schemas.microsoft.com/office/drawing/2014/main" id="{E1B76A13-B545-8719-86CE-83F660CC77D1}"/>
+              </a:ext>
+            </a:extLst>
+          </p:cNvPr>
+          <p:cNvPicPr>
+            <a:picLocks noChangeAspect="1"/>
+          </p:cNvPicPr>
+          <p:nvPr/>
+        </p:nvPicPr>
+        <p:blipFill>
+          <a:blip r:embed="rId7"/>
+          <a:stretch>
+            <a:fillRect/>
+          </a:stretch>
+        </p:blipFill>
+        <p:spPr>
+          <a:xfrm>
+            <a:off x="1607004" y="5695815"/>
+            <a:ext cx="7416044" cy="1097345"/>
+          </a:xfrm>
+          <a:prstGeom prst="rect">
+            <a:avLst/>
+          </a:prstGeom>
+        </p:spPr>
+      </p:pic>
+      <p:sp>
+        <p:nvSpPr>
+          <p:cNvPr id="16" name="Action Button: Help 15">
+            <a:hlinkClick r:id="" action="ppaction://noaction" highlightClick="1"/>
+            <a:extLst>
+              <a:ext uri="{FF2B5EF4-FFF2-40B4-BE49-F238E27FC236}">
+                <a16:creationId xmlns:a16="http://schemas.microsoft.com/office/drawing/2014/main" id="{B9DCE39A-3787-FA76-D3D9-6A979FCB8CE7}"/>
+              </a:ext>
+            </a:extLst>
+          </p:cNvPr>
+          <p:cNvSpPr/>
+          <p:nvPr/>
+        </p:nvSpPr>
+        <p:spPr>
+          <a:xfrm>
+            <a:off x="9660868" y="4305441"/>
+            <a:ext cx="1848256" cy="1939047"/>
+          </a:xfrm>
+          <a:prstGeom prst="actionButtonHelp">
+            <a:avLst/>
+          </a:prstGeom>
+          <a:solidFill>
+            <a:srgbClr val="FF0000"/>
+          </a:solidFill>
+          <a:ln>
+            <a:solidFill>
+              <a:schemeClr val="tx1"/>
+            </a:solidFill>
+          </a:ln>
+        </p:spPr>
+        <p:style>
+          <a:lnRef idx="2">
+            <a:schemeClr val="dk1"/>
+          </a:lnRef>
+          <a:fillRef idx="1">
+            <a:schemeClr val="lt1"/>
+          </a:fillRef>
+          <a:effectRef idx="0">
+            <a:schemeClr val="dk1"/>
+          </a:effectRef>
+          <a:fontRef idx="minor">
+            <a:schemeClr val="dk1"/>
+          </a:fontRef>
+        </p:style>
+        <p:txBody>
+          <a:bodyPr rtlCol="0" anchor="ctr"/>
+          <a:lstStyle/>
+          <a:p>
+            <a:pPr algn="ctr"/>
+            <a:endParaRPr lang="en-US"/>
+          </a:p>
+        </p:txBody>
+      </p:sp>
     </p:spTree>
     <p:extLst>
       <p:ext uri="{BB962C8B-B14F-4D97-AF65-F5344CB8AC3E}">
-        <p14:creationId xmlns:p14="http://schemas.microsoft.com/office/powerpoint/2010/main" val="2495028720"/>
+        <p14:creationId xmlns:p14="http://schemas.microsoft.com/office/powerpoint/2010/main" val="1637514587"/>
       </p:ext>
     </p:extLst>
   </p:cSld>
@@ -6049,10 +5704,10 @@
       </p:grpSpPr>
       <p:pic>
         <p:nvPicPr>
-          <p:cNvPr id="15" name="Picture 14">
-            <a:extLst>
-              <a:ext uri="{FF2B5EF4-FFF2-40B4-BE49-F238E27FC236}">
-                <a16:creationId xmlns:a16="http://schemas.microsoft.com/office/drawing/2014/main" id="{D87E049A-AA47-1343-4C33-5608A6928ECE}"/>
+          <p:cNvPr id="13" name="Picture 12">
+            <a:extLst>
+              <a:ext uri="{FF2B5EF4-FFF2-40B4-BE49-F238E27FC236}">
+                <a16:creationId xmlns:a16="http://schemas.microsoft.com/office/drawing/2014/main" id="{AD52B74E-8FE0-AA43-EC3B-3D4216B574E4}"/>
               </a:ext>
             </a:extLst>
           </p:cNvPr>
@@ -6069,8 +5724,8 @@
         </p:blipFill>
         <p:spPr>
           <a:xfrm>
-            <a:off x="363167" y="444339"/>
-            <a:ext cx="11322995" cy="1845803"/>
+            <a:off x="196129" y="1125118"/>
+            <a:ext cx="6715065" cy="4527537"/>
           </a:xfrm>
           <a:prstGeom prst="rect">
             <a:avLst/>
@@ -6079,10 +5734,10 @@
       </p:pic>
       <p:pic>
         <p:nvPicPr>
-          <p:cNvPr id="3" name="Picture 2">
-            <a:extLst>
-              <a:ext uri="{FF2B5EF4-FFF2-40B4-BE49-F238E27FC236}">
-                <a16:creationId xmlns:a16="http://schemas.microsoft.com/office/drawing/2014/main" id="{36899463-CF7C-66A6-3FA3-90FB4930D02B}"/>
+          <p:cNvPr id="2" name="Picture 1">
+            <a:extLst>
+              <a:ext uri="{FF2B5EF4-FFF2-40B4-BE49-F238E27FC236}">
+                <a16:creationId xmlns:a16="http://schemas.microsoft.com/office/drawing/2014/main" id="{B32F36EF-CE04-78A7-1864-9161F674EAED}"/>
               </a:ext>
             </a:extLst>
           </p:cNvPr>
@@ -6099,146 +5754,18 @@
         </p:blipFill>
         <p:spPr>
           <a:xfrm>
-            <a:off x="201038" y="2546970"/>
-            <a:ext cx="9604443" cy="1389666"/>
+            <a:off x="7084785" y="1125118"/>
+            <a:ext cx="4860586" cy="4527537"/>
           </a:xfrm>
           <a:prstGeom prst="rect">
             <a:avLst/>
           </a:prstGeom>
         </p:spPr>
       </p:pic>
-      <p:pic>
-        <p:nvPicPr>
-          <p:cNvPr id="4" name="Picture 3">
-            <a:extLst>
-              <a:ext uri="{FF2B5EF4-FFF2-40B4-BE49-F238E27FC236}">
-                <a16:creationId xmlns:a16="http://schemas.microsoft.com/office/drawing/2014/main" id="{58747941-99D2-CE8C-D045-12F8786848FF}"/>
-              </a:ext>
-            </a:extLst>
-          </p:cNvPr>
-          <p:cNvPicPr>
-            <a:picLocks noChangeAspect="1"/>
-          </p:cNvPicPr>
-          <p:nvPr/>
-        </p:nvPicPr>
-        <p:blipFill>
-          <a:blip r:embed="rId4"/>
-          <a:stretch>
-            <a:fillRect/>
-          </a:stretch>
-        </p:blipFill>
-        <p:spPr>
-          <a:xfrm>
-            <a:off x="123216" y="4311030"/>
-            <a:ext cx="9286674" cy="1776850"/>
-          </a:xfrm>
-          <a:prstGeom prst="rect">
-            <a:avLst/>
-          </a:prstGeom>
-        </p:spPr>
-      </p:pic>
-      <p:sp>
-        <p:nvSpPr>
-          <p:cNvPr id="2" name="Rectangle 1">
-            <a:extLst>
-              <a:ext uri="{FF2B5EF4-FFF2-40B4-BE49-F238E27FC236}">
-                <a16:creationId xmlns:a16="http://schemas.microsoft.com/office/drawing/2014/main" id="{070C8F18-19C2-68D3-69C8-CB894CD7B1B5}"/>
-              </a:ext>
-            </a:extLst>
-          </p:cNvPr>
-          <p:cNvSpPr/>
-          <p:nvPr/>
-        </p:nvSpPr>
-        <p:spPr>
-          <a:xfrm>
-            <a:off x="11038883" y="3576536"/>
-            <a:ext cx="352660" cy="1744493"/>
-          </a:xfrm>
-          <a:prstGeom prst="rect">
-            <a:avLst/>
-          </a:prstGeom>
-          <a:solidFill>
-            <a:srgbClr val="FF0000"/>
-          </a:solidFill>
-        </p:spPr>
-        <p:style>
-          <a:lnRef idx="2">
-            <a:schemeClr val="accent1">
-              <a:shade val="15000"/>
-            </a:schemeClr>
-          </a:lnRef>
-          <a:fillRef idx="1">
-            <a:schemeClr val="accent1"/>
-          </a:fillRef>
-          <a:effectRef idx="0">
-            <a:schemeClr val="accent1"/>
-          </a:effectRef>
-          <a:fontRef idx="minor">
-            <a:schemeClr val="lt1"/>
-          </a:fontRef>
-        </p:style>
-        <p:txBody>
-          <a:bodyPr rtlCol="0" anchor="ctr"/>
-          <a:lstStyle/>
-          <a:p>
-            <a:pPr algn="ctr"/>
-            <a:endParaRPr lang="en-US"/>
-          </a:p>
-        </p:txBody>
-      </p:sp>
-      <p:sp>
-        <p:nvSpPr>
-          <p:cNvPr id="5" name="Oval 4">
-            <a:extLst>
-              <a:ext uri="{FF2B5EF4-FFF2-40B4-BE49-F238E27FC236}">
-                <a16:creationId xmlns:a16="http://schemas.microsoft.com/office/drawing/2014/main" id="{E9B3947E-FF9B-C579-3060-3D8138DE9AC9}"/>
-              </a:ext>
-            </a:extLst>
-          </p:cNvPr>
-          <p:cNvSpPr/>
-          <p:nvPr/>
-        </p:nvSpPr>
-        <p:spPr>
-          <a:xfrm>
-            <a:off x="11038883" y="5583676"/>
-            <a:ext cx="466928" cy="479897"/>
-          </a:xfrm>
-          <a:prstGeom prst="ellipse">
-            <a:avLst/>
-          </a:prstGeom>
-          <a:solidFill>
-            <a:srgbClr val="FF0000"/>
-          </a:solidFill>
-        </p:spPr>
-        <p:style>
-          <a:lnRef idx="2">
-            <a:schemeClr val="accent1">
-              <a:shade val="15000"/>
-            </a:schemeClr>
-          </a:lnRef>
-          <a:fillRef idx="1">
-            <a:schemeClr val="accent1"/>
-          </a:fillRef>
-          <a:effectRef idx="0">
-            <a:schemeClr val="accent1"/>
-          </a:effectRef>
-          <a:fontRef idx="minor">
-            <a:schemeClr val="lt1"/>
-          </a:fontRef>
-        </p:style>
-        <p:txBody>
-          <a:bodyPr rtlCol="0" anchor="ctr"/>
-          <a:lstStyle/>
-          <a:p>
-            <a:pPr algn="ctr"/>
-            <a:endParaRPr lang="en-US"/>
-          </a:p>
-        </p:txBody>
-      </p:sp>
     </p:spTree>
     <p:extLst>
       <p:ext uri="{BB962C8B-B14F-4D97-AF65-F5344CB8AC3E}">
-        <p14:creationId xmlns:p14="http://schemas.microsoft.com/office/powerpoint/2010/main" val="1694186701"/>
+        <p14:creationId xmlns:p14="http://schemas.microsoft.com/office/powerpoint/2010/main" val="2495028720"/>
       </p:ext>
     </p:extLst>
   </p:cSld>
@@ -6309,8 +5836,8 @@
         </p:blipFill>
         <p:spPr>
           <a:xfrm>
-            <a:off x="480054" y="1667540"/>
-            <a:ext cx="3167870" cy="4820988"/>
+            <a:off x="131711" y="1158892"/>
+            <a:ext cx="1658384" cy="2523794"/>
           </a:xfrm>
           <a:prstGeom prst="rect">
             <a:avLst/>
@@ -6319,10 +5846,10 @@
       </p:pic>
       <p:pic>
         <p:nvPicPr>
-          <p:cNvPr id="11" name="Picture 10">
-            <a:extLst>
-              <a:ext uri="{FF2B5EF4-FFF2-40B4-BE49-F238E27FC236}">
-                <a16:creationId xmlns:a16="http://schemas.microsoft.com/office/drawing/2014/main" id="{3569B3D7-E3B3-BFF3-41B5-4B217BE6DE75}"/>
+          <p:cNvPr id="9" name="Picture 8">
+            <a:extLst>
+              <a:ext uri="{FF2B5EF4-FFF2-40B4-BE49-F238E27FC236}">
+                <a16:creationId xmlns:a16="http://schemas.microsoft.com/office/drawing/2014/main" id="{46312393-49E7-9E41-81EB-67C9E949AD42}"/>
               </a:ext>
             </a:extLst>
           </p:cNvPr>
@@ -6339,8 +5866,8 @@
         </p:blipFill>
         <p:spPr>
           <a:xfrm>
-            <a:off x="4939386" y="1483691"/>
-            <a:ext cx="2105235" cy="4820989"/>
+            <a:off x="131711" y="138175"/>
+            <a:ext cx="3912184" cy="969181"/>
           </a:xfrm>
           <a:prstGeom prst="rect">
             <a:avLst/>
@@ -6349,10 +5876,10 @@
       </p:pic>
       <p:pic>
         <p:nvPicPr>
-          <p:cNvPr id="25" name="Picture 24">
-            <a:extLst>
-              <a:ext uri="{FF2B5EF4-FFF2-40B4-BE49-F238E27FC236}">
-                <a16:creationId xmlns:a16="http://schemas.microsoft.com/office/drawing/2014/main" id="{AEBBC3D8-824E-953D-58DC-69C533031A9E}"/>
+          <p:cNvPr id="11" name="Picture 10">
+            <a:extLst>
+              <a:ext uri="{FF2B5EF4-FFF2-40B4-BE49-F238E27FC236}">
+                <a16:creationId xmlns:a16="http://schemas.microsoft.com/office/drawing/2014/main" id="{3569B3D7-E3B3-BFF3-41B5-4B217BE6DE75}"/>
               </a:ext>
             </a:extLst>
           </p:cNvPr>
@@ -6369,8 +5896,8 @@
         </p:blipFill>
         <p:spPr>
           <a:xfrm>
-            <a:off x="8839200" y="627729"/>
-            <a:ext cx="2016403" cy="5676951"/>
+            <a:off x="1946192" y="1158892"/>
+            <a:ext cx="1441848" cy="3301832"/>
           </a:xfrm>
           <a:prstGeom prst="rect">
             <a:avLst/>
@@ -6379,10 +5906,10 @@
       </p:pic>
       <p:pic>
         <p:nvPicPr>
-          <p:cNvPr id="3" name="Picture 2">
-            <a:extLst>
-              <a:ext uri="{FF2B5EF4-FFF2-40B4-BE49-F238E27FC236}">
-                <a16:creationId xmlns:a16="http://schemas.microsoft.com/office/drawing/2014/main" id="{0B5E31B6-C73B-AA2B-8CE8-D7B376F16687}"/>
+          <p:cNvPr id="13" name="Picture 12">
+            <a:extLst>
+              <a:ext uri="{FF2B5EF4-FFF2-40B4-BE49-F238E27FC236}">
+                <a16:creationId xmlns:a16="http://schemas.microsoft.com/office/drawing/2014/main" id="{993053EE-C1D6-2D11-965C-C1397E4747A6}"/>
               </a:ext>
             </a:extLst>
           </p:cNvPr>
@@ -6399,8 +5926,8 @@
         </p:blipFill>
         <p:spPr>
           <a:xfrm>
-            <a:off x="281692" y="204367"/>
-            <a:ext cx="4077269" cy="1152686"/>
+            <a:off x="3423682" y="1195009"/>
+            <a:ext cx="1441847" cy="3402567"/>
           </a:xfrm>
           <a:prstGeom prst="rect">
             <a:avLst/>
@@ -6409,10 +5936,10 @@
       </p:pic>
       <p:pic>
         <p:nvPicPr>
-          <p:cNvPr id="4" name="Picture 3">
-            <a:extLst>
-              <a:ext uri="{FF2B5EF4-FFF2-40B4-BE49-F238E27FC236}">
-                <a16:creationId xmlns:a16="http://schemas.microsoft.com/office/drawing/2014/main" id="{FE9671B7-ADB0-7DF0-7C60-DC3C7DC3A014}"/>
+          <p:cNvPr id="15" name="Picture 14">
+            <a:extLst>
+              <a:ext uri="{FF2B5EF4-FFF2-40B4-BE49-F238E27FC236}">
+                <a16:creationId xmlns:a16="http://schemas.microsoft.com/office/drawing/2014/main" id="{F7E4C45D-F7CC-DF5A-48B6-1636AD5550A1}"/>
               </a:ext>
             </a:extLst>
           </p:cNvPr>
@@ -6429,8 +5956,8 @@
         </p:blipFill>
         <p:spPr>
           <a:xfrm>
-            <a:off x="304815" y="6858000"/>
-            <a:ext cx="2693558" cy="6858000"/>
+            <a:off x="186087" y="3734222"/>
+            <a:ext cx="1578829" cy="1867765"/>
           </a:xfrm>
           <a:prstGeom prst="rect">
             <a:avLst/>
@@ -6439,10 +5966,10 @@
       </p:pic>
       <p:pic>
         <p:nvPicPr>
-          <p:cNvPr id="7" name="Picture 6">
-            <a:extLst>
-              <a:ext uri="{FF2B5EF4-FFF2-40B4-BE49-F238E27FC236}">
-                <a16:creationId xmlns:a16="http://schemas.microsoft.com/office/drawing/2014/main" id="{7E82C991-B79E-F258-C9F0-8674C6EFA476}"/>
+          <p:cNvPr id="17" name="Picture 16">
+            <a:extLst>
+              <a:ext uri="{FF2B5EF4-FFF2-40B4-BE49-F238E27FC236}">
+                <a16:creationId xmlns:a16="http://schemas.microsoft.com/office/drawing/2014/main" id="{F25BD4EA-CEBB-D70F-C266-A21544C6A8E4}"/>
               </a:ext>
             </a:extLst>
           </p:cNvPr>
@@ -6459,8 +5986,8 @@
         </p:blipFill>
         <p:spPr>
           <a:xfrm>
-            <a:off x="4713671" y="-6864573"/>
-            <a:ext cx="2330950" cy="6858000"/>
+            <a:off x="4906616" y="198629"/>
+            <a:ext cx="1425116" cy="3072973"/>
           </a:xfrm>
           <a:prstGeom prst="rect">
             <a:avLst/>
@@ -6469,10 +5996,10 @@
       </p:pic>
       <p:pic>
         <p:nvPicPr>
-          <p:cNvPr id="10" name="Picture 9">
-            <a:extLst>
-              <a:ext uri="{FF2B5EF4-FFF2-40B4-BE49-F238E27FC236}">
-                <a16:creationId xmlns:a16="http://schemas.microsoft.com/office/drawing/2014/main" id="{8840ADE1-E7AF-9E7D-EC69-A69E0CDC1087}"/>
+          <p:cNvPr id="19" name="Picture 18">
+            <a:extLst>
+              <a:ext uri="{FF2B5EF4-FFF2-40B4-BE49-F238E27FC236}">
+                <a16:creationId xmlns:a16="http://schemas.microsoft.com/office/drawing/2014/main" id="{2D1230EF-B7E6-7C05-4A2B-838F949C04F1}"/>
               </a:ext>
             </a:extLst>
           </p:cNvPr>
@@ -6489,8 +6016,188 @@
         </p:blipFill>
         <p:spPr>
           <a:xfrm>
-            <a:off x="12733767" y="-119724"/>
-            <a:ext cx="2476942" cy="6858000"/>
+            <a:off x="6396313" y="249300"/>
+            <a:ext cx="2295761" cy="2893181"/>
+          </a:xfrm>
+          <a:prstGeom prst="rect">
+            <a:avLst/>
+          </a:prstGeom>
+        </p:spPr>
+      </p:pic>
+      <p:pic>
+        <p:nvPicPr>
+          <p:cNvPr id="21" name="Picture 20">
+            <a:extLst>
+              <a:ext uri="{FF2B5EF4-FFF2-40B4-BE49-F238E27FC236}">
+                <a16:creationId xmlns:a16="http://schemas.microsoft.com/office/drawing/2014/main" id="{C7067457-7856-EBBE-7A37-7F8CE8846A8A}"/>
+              </a:ext>
+            </a:extLst>
+          </p:cNvPr>
+          <p:cNvPicPr>
+            <a:picLocks noChangeAspect="1"/>
+          </p:cNvPicPr>
+          <p:nvPr/>
+        </p:nvPicPr>
+        <p:blipFill>
+          <a:blip r:embed="rId9"/>
+          <a:stretch>
+            <a:fillRect/>
+          </a:stretch>
+        </p:blipFill>
+        <p:spPr>
+          <a:xfrm>
+            <a:off x="8756655" y="249300"/>
+            <a:ext cx="1657877" cy="3877166"/>
+          </a:xfrm>
+          <a:prstGeom prst="rect">
+            <a:avLst/>
+          </a:prstGeom>
+        </p:spPr>
+      </p:pic>
+      <p:pic>
+        <p:nvPicPr>
+          <p:cNvPr id="23" name="Picture 22">
+            <a:extLst>
+              <a:ext uri="{FF2B5EF4-FFF2-40B4-BE49-F238E27FC236}">
+                <a16:creationId xmlns:a16="http://schemas.microsoft.com/office/drawing/2014/main" id="{57A7377A-B26D-DE51-F4E8-6C9F94E45C9C}"/>
+              </a:ext>
+            </a:extLst>
+          </p:cNvPr>
+          <p:cNvPicPr>
+            <a:picLocks noChangeAspect="1"/>
+          </p:cNvPicPr>
+          <p:nvPr/>
+        </p:nvPicPr>
+        <p:blipFill>
+          <a:blip r:embed="rId10"/>
+          <a:stretch>
+            <a:fillRect/>
+          </a:stretch>
+        </p:blipFill>
+        <p:spPr>
+          <a:xfrm>
+            <a:off x="8822230" y="4246596"/>
+            <a:ext cx="1660751" cy="684268"/>
+          </a:xfrm>
+          <a:prstGeom prst="rect">
+            <a:avLst/>
+          </a:prstGeom>
+        </p:spPr>
+      </p:pic>
+      <p:pic>
+        <p:nvPicPr>
+          <p:cNvPr id="25" name="Picture 24">
+            <a:extLst>
+              <a:ext uri="{FF2B5EF4-FFF2-40B4-BE49-F238E27FC236}">
+                <a16:creationId xmlns:a16="http://schemas.microsoft.com/office/drawing/2014/main" id="{AEBBC3D8-824E-953D-58DC-69C533031A9E}"/>
+              </a:ext>
+            </a:extLst>
+          </p:cNvPr>
+          <p:cNvPicPr>
+            <a:picLocks noChangeAspect="1"/>
+          </p:cNvPicPr>
+          <p:nvPr/>
+        </p:nvPicPr>
+        <p:blipFill>
+          <a:blip r:embed="rId11"/>
+          <a:stretch>
+            <a:fillRect/>
+          </a:stretch>
+        </p:blipFill>
+        <p:spPr>
+          <a:xfrm>
+            <a:off x="10551431" y="249300"/>
+            <a:ext cx="1508858" cy="4248016"/>
+          </a:xfrm>
+          <a:prstGeom prst="rect">
+            <a:avLst/>
+          </a:prstGeom>
+        </p:spPr>
+      </p:pic>
+      <p:pic>
+        <p:nvPicPr>
+          <p:cNvPr id="27" name="Picture 26">
+            <a:extLst>
+              <a:ext uri="{FF2B5EF4-FFF2-40B4-BE49-F238E27FC236}">
+                <a16:creationId xmlns:a16="http://schemas.microsoft.com/office/drawing/2014/main" id="{C2245C44-342D-6FCF-6541-EA53A01D133F}"/>
+              </a:ext>
+            </a:extLst>
+          </p:cNvPr>
+          <p:cNvPicPr>
+            <a:picLocks noChangeAspect="1"/>
+          </p:cNvPicPr>
+          <p:nvPr/>
+        </p:nvPicPr>
+        <p:blipFill>
+          <a:blip r:embed="rId12"/>
+          <a:stretch>
+            <a:fillRect/>
+          </a:stretch>
+        </p:blipFill>
+        <p:spPr>
+          <a:xfrm>
+            <a:off x="4901171" y="3309747"/>
+            <a:ext cx="1508857" cy="3155148"/>
+          </a:xfrm>
+          <a:prstGeom prst="rect">
+            <a:avLst/>
+          </a:prstGeom>
+        </p:spPr>
+      </p:pic>
+      <p:pic>
+        <p:nvPicPr>
+          <p:cNvPr id="29" name="Picture 28">
+            <a:extLst>
+              <a:ext uri="{FF2B5EF4-FFF2-40B4-BE49-F238E27FC236}">
+                <a16:creationId xmlns:a16="http://schemas.microsoft.com/office/drawing/2014/main" id="{5BAF1578-F8DA-A30B-A1D4-16B55661AE8F}"/>
+              </a:ext>
+            </a:extLst>
+          </p:cNvPr>
+          <p:cNvPicPr>
+            <a:picLocks noChangeAspect="1"/>
+          </p:cNvPicPr>
+          <p:nvPr/>
+        </p:nvPicPr>
+        <p:blipFill>
+          <a:blip r:embed="rId13"/>
+          <a:stretch>
+            <a:fillRect/>
+          </a:stretch>
+        </p:blipFill>
+        <p:spPr>
+          <a:xfrm>
+            <a:off x="6474609" y="3336357"/>
+            <a:ext cx="1562118" cy="3078957"/>
+          </a:xfrm>
+          <a:prstGeom prst="rect">
+            <a:avLst/>
+          </a:prstGeom>
+        </p:spPr>
+      </p:pic>
+      <p:pic>
+        <p:nvPicPr>
+          <p:cNvPr id="31" name="Picture 30">
+            <a:extLst>
+              <a:ext uri="{FF2B5EF4-FFF2-40B4-BE49-F238E27FC236}">
+                <a16:creationId xmlns:a16="http://schemas.microsoft.com/office/drawing/2014/main" id="{6B276FCE-7392-9C97-535F-878E316E1E95}"/>
+              </a:ext>
+            </a:extLst>
+          </p:cNvPr>
+          <p:cNvPicPr>
+            <a:picLocks noChangeAspect="1"/>
+          </p:cNvPicPr>
+          <p:nvPr/>
+        </p:nvPicPr>
+        <p:blipFill>
+          <a:blip r:embed="rId14"/>
+          <a:stretch>
+            <a:fillRect/>
+          </a:stretch>
+        </p:blipFill>
+        <p:spPr>
+          <a:xfrm>
+            <a:off x="8362815" y="5050994"/>
+            <a:ext cx="1657877" cy="1425911"/>
           </a:xfrm>
           <a:prstGeom prst="rect">
             <a:avLst/>
@@ -6500,7 +6207,235 @@
     </p:spTree>
     <p:extLst>
       <p:ext uri="{BB962C8B-B14F-4D97-AF65-F5344CB8AC3E}">
-        <p14:creationId xmlns:p14="http://schemas.microsoft.com/office/powerpoint/2010/main" val="3818739958"/>
+        <p14:creationId xmlns:p14="http://schemas.microsoft.com/office/powerpoint/2010/main" val="1212003208"/>
+      </p:ext>
+    </p:extLst>
+  </p:cSld>
+  <p:clrMapOvr>
+    <a:masterClrMapping/>
+  </p:clrMapOvr>
+</p:sld>
+</file>
+
+<file path=ppt/slides/slide20.xml><?xml version="1.0" encoding="utf-8"?>
+<p:sld xmlns:a="http://schemas.openxmlformats.org/drawingml/2006/main" xmlns:r="http://schemas.openxmlformats.org/officeDocument/2006/relationships" xmlns:p="http://schemas.openxmlformats.org/presentationml/2006/main" showMasterSp="0">
+  <p:cSld>
+    <p:bg>
+      <p:bgPr>
+        <a:solidFill>
+          <a:schemeClr val="bg1">
+            <a:lumMod val="50000"/>
+          </a:schemeClr>
+        </a:solidFill>
+        <a:effectLst/>
+      </p:bgPr>
+    </p:bg>
+    <p:spTree>
+      <p:nvGrpSpPr>
+        <p:cNvPr id="1" name=""/>
+        <p:cNvGrpSpPr/>
+        <p:nvPr/>
+      </p:nvGrpSpPr>
+      <p:grpSpPr>
+        <a:xfrm>
+          <a:off x="0" y="0"/>
+          <a:ext cx="0" cy="0"/>
+          <a:chOff x="0" y="0"/>
+          <a:chExt cx="0" cy="0"/>
+        </a:xfrm>
+      </p:grpSpPr>
+      <p:pic>
+        <p:nvPicPr>
+          <p:cNvPr id="15" name="Picture 14">
+            <a:extLst>
+              <a:ext uri="{FF2B5EF4-FFF2-40B4-BE49-F238E27FC236}">
+                <a16:creationId xmlns:a16="http://schemas.microsoft.com/office/drawing/2014/main" id="{D87E049A-AA47-1343-4C33-5608A6928ECE}"/>
+              </a:ext>
+            </a:extLst>
+          </p:cNvPr>
+          <p:cNvPicPr>
+            <a:picLocks noChangeAspect="1"/>
+          </p:cNvPicPr>
+          <p:nvPr/>
+        </p:nvPicPr>
+        <p:blipFill>
+          <a:blip r:embed="rId2"/>
+          <a:stretch>
+            <a:fillRect/>
+          </a:stretch>
+        </p:blipFill>
+        <p:spPr>
+          <a:xfrm>
+            <a:off x="363167" y="444339"/>
+            <a:ext cx="11322995" cy="1845803"/>
+          </a:xfrm>
+          <a:prstGeom prst="rect">
+            <a:avLst/>
+          </a:prstGeom>
+        </p:spPr>
+      </p:pic>
+      <p:pic>
+        <p:nvPicPr>
+          <p:cNvPr id="3" name="Picture 2">
+            <a:extLst>
+              <a:ext uri="{FF2B5EF4-FFF2-40B4-BE49-F238E27FC236}">
+                <a16:creationId xmlns:a16="http://schemas.microsoft.com/office/drawing/2014/main" id="{36899463-CF7C-66A6-3FA3-90FB4930D02B}"/>
+              </a:ext>
+            </a:extLst>
+          </p:cNvPr>
+          <p:cNvPicPr>
+            <a:picLocks noChangeAspect="1"/>
+          </p:cNvPicPr>
+          <p:nvPr/>
+        </p:nvPicPr>
+        <p:blipFill>
+          <a:blip r:embed="rId3"/>
+          <a:stretch>
+            <a:fillRect/>
+          </a:stretch>
+        </p:blipFill>
+        <p:spPr>
+          <a:xfrm>
+            <a:off x="201038" y="2546970"/>
+            <a:ext cx="9604443" cy="1389666"/>
+          </a:xfrm>
+          <a:prstGeom prst="rect">
+            <a:avLst/>
+          </a:prstGeom>
+        </p:spPr>
+      </p:pic>
+      <p:pic>
+        <p:nvPicPr>
+          <p:cNvPr id="4" name="Picture 3">
+            <a:extLst>
+              <a:ext uri="{FF2B5EF4-FFF2-40B4-BE49-F238E27FC236}">
+                <a16:creationId xmlns:a16="http://schemas.microsoft.com/office/drawing/2014/main" id="{58747941-99D2-CE8C-D045-12F8786848FF}"/>
+              </a:ext>
+            </a:extLst>
+          </p:cNvPr>
+          <p:cNvPicPr>
+            <a:picLocks noChangeAspect="1"/>
+          </p:cNvPicPr>
+          <p:nvPr/>
+        </p:nvPicPr>
+        <p:blipFill>
+          <a:blip r:embed="rId4"/>
+          <a:stretch>
+            <a:fillRect/>
+          </a:stretch>
+        </p:blipFill>
+        <p:spPr>
+          <a:xfrm>
+            <a:off x="123216" y="4311030"/>
+            <a:ext cx="9286674" cy="1776850"/>
+          </a:xfrm>
+          <a:prstGeom prst="rect">
+            <a:avLst/>
+          </a:prstGeom>
+        </p:spPr>
+      </p:pic>
+      <p:sp>
+        <p:nvSpPr>
+          <p:cNvPr id="2" name="Rectangle 1">
+            <a:extLst>
+              <a:ext uri="{FF2B5EF4-FFF2-40B4-BE49-F238E27FC236}">
+                <a16:creationId xmlns:a16="http://schemas.microsoft.com/office/drawing/2014/main" id="{070C8F18-19C2-68D3-69C8-CB894CD7B1B5}"/>
+              </a:ext>
+            </a:extLst>
+          </p:cNvPr>
+          <p:cNvSpPr/>
+          <p:nvPr/>
+        </p:nvSpPr>
+        <p:spPr>
+          <a:xfrm>
+            <a:off x="11038883" y="3576536"/>
+            <a:ext cx="352660" cy="1744493"/>
+          </a:xfrm>
+          <a:prstGeom prst="rect">
+            <a:avLst/>
+          </a:prstGeom>
+          <a:solidFill>
+            <a:srgbClr val="FF0000"/>
+          </a:solidFill>
+        </p:spPr>
+        <p:style>
+          <a:lnRef idx="2">
+            <a:schemeClr val="accent1">
+              <a:shade val="15000"/>
+            </a:schemeClr>
+          </a:lnRef>
+          <a:fillRef idx="1">
+            <a:schemeClr val="accent1"/>
+          </a:fillRef>
+          <a:effectRef idx="0">
+            <a:schemeClr val="accent1"/>
+          </a:effectRef>
+          <a:fontRef idx="minor">
+            <a:schemeClr val="lt1"/>
+          </a:fontRef>
+        </p:style>
+        <p:txBody>
+          <a:bodyPr rtlCol="0" anchor="ctr"/>
+          <a:lstStyle/>
+          <a:p>
+            <a:pPr algn="ctr"/>
+            <a:endParaRPr lang="en-US"/>
+          </a:p>
+        </p:txBody>
+      </p:sp>
+      <p:sp>
+        <p:nvSpPr>
+          <p:cNvPr id="5" name="Oval 4">
+            <a:extLst>
+              <a:ext uri="{FF2B5EF4-FFF2-40B4-BE49-F238E27FC236}">
+                <a16:creationId xmlns:a16="http://schemas.microsoft.com/office/drawing/2014/main" id="{E9B3947E-FF9B-C579-3060-3D8138DE9AC9}"/>
+              </a:ext>
+            </a:extLst>
+          </p:cNvPr>
+          <p:cNvSpPr/>
+          <p:nvPr/>
+        </p:nvSpPr>
+        <p:spPr>
+          <a:xfrm>
+            <a:off x="11038883" y="5583676"/>
+            <a:ext cx="466928" cy="479897"/>
+          </a:xfrm>
+          <a:prstGeom prst="ellipse">
+            <a:avLst/>
+          </a:prstGeom>
+          <a:solidFill>
+            <a:srgbClr val="FF0000"/>
+          </a:solidFill>
+        </p:spPr>
+        <p:style>
+          <a:lnRef idx="2">
+            <a:schemeClr val="accent1">
+              <a:shade val="15000"/>
+            </a:schemeClr>
+          </a:lnRef>
+          <a:fillRef idx="1">
+            <a:schemeClr val="accent1"/>
+          </a:fillRef>
+          <a:effectRef idx="0">
+            <a:schemeClr val="accent1"/>
+          </a:effectRef>
+          <a:fontRef idx="minor">
+            <a:schemeClr val="lt1"/>
+          </a:fontRef>
+        </p:style>
+        <p:txBody>
+          <a:bodyPr rtlCol="0" anchor="ctr"/>
+          <a:lstStyle/>
+          <a:p>
+            <a:pPr algn="ctr"/>
+            <a:endParaRPr lang="en-US"/>
+          </a:p>
+        </p:txBody>
+      </p:sp>
+    </p:spTree>
+    <p:extLst>
+      <p:ext uri="{BB962C8B-B14F-4D97-AF65-F5344CB8AC3E}">
+        <p14:creationId xmlns:p14="http://schemas.microsoft.com/office/powerpoint/2010/main" val="1694186701"/>
       </p:ext>
     </p:extLst>
   </p:cSld>
@@ -6522,7 +6457,7 @@
 </p:sld>
 </file>
 
-<file path=ppt/slides/slide20.xml><?xml version="1.0" encoding="utf-8"?>
+<file path=ppt/slides/slide21.xml><?xml version="1.0" encoding="utf-8"?>
 <p:sld xmlns:a="http://schemas.openxmlformats.org/drawingml/2006/main" xmlns:r="http://schemas.openxmlformats.org/officeDocument/2006/relationships" xmlns:p="http://schemas.openxmlformats.org/presentationml/2006/main" showMasterSp="0">
   <p:cSld>
     <p:bg>
@@ -6996,7 +6931,7 @@
 </p:sld>
 </file>
 
-<file path=ppt/slides/slide21.xml><?xml version="1.0" encoding="utf-8"?>
+<file path=ppt/slides/slide22.xml><?xml version="1.0" encoding="utf-8"?>
 <p:sld xmlns:a="http://schemas.openxmlformats.org/drawingml/2006/main" xmlns:r="http://schemas.openxmlformats.org/officeDocument/2006/relationships" xmlns:p="http://schemas.openxmlformats.org/presentationml/2006/main" showMasterSp="0">
   <p:cSld>
     <p:bg>
@@ -7073,8 +7008,8 @@
             <a:chExt cx="2203200" cy="1792800"/>
           </a:xfrm>
         </p:grpSpPr>
-        <mc:AlternateContent xmlns:mc="http://schemas.openxmlformats.org/markup-compatibility/2006">
-          <mc:Choice xmlns:p14="http://schemas.microsoft.com/office/powerpoint/2010/main" Requires="p14">
+        <mc:AlternateContent xmlns:mc="http://schemas.openxmlformats.org/markup-compatibility/2006" xmlns:p14="http://schemas.microsoft.com/office/powerpoint/2010/main">
+          <mc:Choice Requires="p14">
             <p:contentPart p14:bwMode="auto" r:id="rId3">
               <p14:nvContentPartPr>
                 <p14:cNvPr id="24" name="Ink 23">
@@ -7093,7 +7028,7 @@
               </p14:xfrm>
             </p:contentPart>
           </mc:Choice>
-          <mc:Fallback>
+          <mc:Fallback xmlns="">
             <p:pic>
               <p:nvPicPr>
                 <p:cNvPr id="24" name="Ink 23">
@@ -7124,8 +7059,8 @@
             </p:pic>
           </mc:Fallback>
         </mc:AlternateContent>
-        <mc:AlternateContent xmlns:mc="http://schemas.openxmlformats.org/markup-compatibility/2006">
-          <mc:Choice xmlns:p14="http://schemas.microsoft.com/office/powerpoint/2010/main" Requires="p14">
+        <mc:AlternateContent xmlns:mc="http://schemas.openxmlformats.org/markup-compatibility/2006" xmlns:p14="http://schemas.microsoft.com/office/powerpoint/2010/main">
+          <mc:Choice Requires="p14">
             <p:contentPart p14:bwMode="auto" r:id="rId5">
               <p14:nvContentPartPr>
                 <p14:cNvPr id="25" name="Ink 24">
@@ -7144,7 +7079,7 @@
               </p14:xfrm>
             </p:contentPart>
           </mc:Choice>
-          <mc:Fallback>
+          <mc:Fallback xmlns="">
             <p:pic>
               <p:nvPicPr>
                 <p:cNvPr id="25" name="Ink 24">
@@ -7175,8 +7110,8 @@
             </p:pic>
           </mc:Fallback>
         </mc:AlternateContent>
-        <mc:AlternateContent xmlns:mc="http://schemas.openxmlformats.org/markup-compatibility/2006">
-          <mc:Choice xmlns:p14="http://schemas.microsoft.com/office/powerpoint/2010/main" Requires="p14">
+        <mc:AlternateContent xmlns:mc="http://schemas.openxmlformats.org/markup-compatibility/2006" xmlns:p14="http://schemas.microsoft.com/office/powerpoint/2010/main">
+          <mc:Choice Requires="p14">
             <p:contentPart p14:bwMode="auto" r:id="rId7">
               <p14:nvContentPartPr>
                 <p14:cNvPr id="26" name="Ink 25">
@@ -7195,7 +7130,7 @@
               </p14:xfrm>
             </p:contentPart>
           </mc:Choice>
-          <mc:Fallback>
+          <mc:Fallback xmlns="">
             <p:pic>
               <p:nvPicPr>
                 <p:cNvPr id="26" name="Ink 25">
@@ -7226,8 +7161,8 @@
             </p:pic>
           </mc:Fallback>
         </mc:AlternateContent>
-        <mc:AlternateContent xmlns:mc="http://schemas.openxmlformats.org/markup-compatibility/2006">
-          <mc:Choice xmlns:p14="http://schemas.microsoft.com/office/powerpoint/2010/main" Requires="p14">
+        <mc:AlternateContent xmlns:mc="http://schemas.openxmlformats.org/markup-compatibility/2006" xmlns:p14="http://schemas.microsoft.com/office/powerpoint/2010/main">
+          <mc:Choice Requires="p14">
             <p:contentPart p14:bwMode="auto" r:id="rId9">
               <p14:nvContentPartPr>
                 <p14:cNvPr id="27" name="Ink 26">
@@ -7246,7 +7181,7 @@
               </p14:xfrm>
             </p:contentPart>
           </mc:Choice>
-          <mc:Fallback>
+          <mc:Fallback xmlns="">
             <p:pic>
               <p:nvPicPr>
                 <p:cNvPr id="27" name="Ink 26">
@@ -7323,13 +7258,13 @@
   <p:clrMapOvr>
     <a:masterClrMapping/>
   </p:clrMapOvr>
-  <mc:AlternateContent xmlns:mc="http://schemas.openxmlformats.org/markup-compatibility/2006">
-    <mc:Choice xmlns:p159="http://schemas.microsoft.com/office/powerpoint/2015/09/main" Requires="p159">
+  <mc:AlternateContent xmlns:mc="http://schemas.openxmlformats.org/markup-compatibility/2006" xmlns:p159="http://schemas.microsoft.com/office/powerpoint/2015/09/main">
+    <mc:Choice Requires="p159">
       <p:transition xmlns:p14="http://schemas.microsoft.com/office/powerpoint/2010/main" spd="slow" p14:dur="2000">
         <p159:morph option="byObject"/>
       </p:transition>
     </mc:Choice>
-    <mc:Fallback>
+    <mc:Fallback xmlns="">
       <p:transition spd="slow">
         <p:fade/>
       </p:transition>
@@ -7387,7 +7322,7 @@
         </p:blipFill>
         <p:spPr>
           <a:xfrm>
-            <a:off x="304815" y="-4827561"/>
+            <a:off x="480054" y="1667540"/>
             <a:ext cx="3167870" cy="4820988"/>
           </a:xfrm>
           <a:prstGeom prst="rect">
@@ -7417,7 +7352,7 @@
         </p:blipFill>
         <p:spPr>
           <a:xfrm>
-            <a:off x="4713671" y="7201585"/>
+            <a:off x="4939386" y="1483691"/>
             <a:ext cx="2105235" cy="4820989"/>
           </a:xfrm>
           <a:prstGeom prst="rect">
@@ -7447,7 +7382,7 @@
         </p:blipFill>
         <p:spPr>
           <a:xfrm>
-            <a:off x="13816314" y="211040"/>
+            <a:off x="8839200" y="627729"/>
             <a:ext cx="2016403" cy="5676951"/>
           </a:xfrm>
           <a:prstGeom prst="rect">
@@ -7477,7 +7412,7 @@
         </p:blipFill>
         <p:spPr>
           <a:xfrm>
-            <a:off x="-2974806" y="-2993410"/>
+            <a:off x="281692" y="204367"/>
             <a:ext cx="4077269" cy="1152686"/>
           </a:xfrm>
           <a:prstGeom prst="rect">
@@ -7507,7 +7442,7 @@
         </p:blipFill>
         <p:spPr>
           <a:xfrm>
-            <a:off x="541971" y="37204"/>
+            <a:off x="304815" y="6858000"/>
             <a:ext cx="2693558" cy="6858000"/>
           </a:xfrm>
           <a:prstGeom prst="rect">
@@ -7537,7 +7472,7 @@
         </p:blipFill>
         <p:spPr>
           <a:xfrm>
-            <a:off x="4713671" y="37204"/>
+            <a:off x="4713671" y="-6864573"/>
             <a:ext cx="2330950" cy="6858000"/>
           </a:xfrm>
           <a:prstGeom prst="rect">
@@ -7567,7 +7502,7 @@
         </p:blipFill>
         <p:spPr>
           <a:xfrm>
-            <a:off x="8404835" y="-6573"/>
+            <a:off x="12733767" y="-119724"/>
             <a:ext cx="2476942" cy="6858000"/>
           </a:xfrm>
           <a:prstGeom prst="rect">
@@ -7578,7 +7513,7 @@
     </p:spTree>
     <p:extLst>
       <p:ext uri="{BB962C8B-B14F-4D97-AF65-F5344CB8AC3E}">
-        <p14:creationId xmlns:p14="http://schemas.microsoft.com/office/powerpoint/2010/main" val="1012324529"/>
+        <p14:creationId xmlns:p14="http://schemas.microsoft.com/office/powerpoint/2010/main" val="3818739958"/>
       </p:ext>
     </p:extLst>
   </p:cSld>
@@ -7629,10 +7564,10 @@
       </p:grpSpPr>
       <p:pic>
         <p:nvPicPr>
-          <p:cNvPr id="4" name="Picture 3">
-            <a:extLst>
-              <a:ext uri="{FF2B5EF4-FFF2-40B4-BE49-F238E27FC236}">
-                <a16:creationId xmlns:a16="http://schemas.microsoft.com/office/drawing/2014/main" id="{FE9671B7-ADB0-7DF0-7C60-DC3C7DC3A014}"/>
+          <p:cNvPr id="5" name="Picture 4">
+            <a:extLst>
+              <a:ext uri="{FF2B5EF4-FFF2-40B4-BE49-F238E27FC236}">
+                <a16:creationId xmlns:a16="http://schemas.microsoft.com/office/drawing/2014/main" id="{367CAF27-8B7F-0206-02DD-91AA869173D7}"/>
               </a:ext>
             </a:extLst>
           </p:cNvPr>
@@ -7649,8 +7584,8 @@
         </p:blipFill>
         <p:spPr>
           <a:xfrm>
-            <a:off x="541971" y="37204"/>
-            <a:ext cx="2693558" cy="6858000"/>
+            <a:off x="304815" y="-4827561"/>
+            <a:ext cx="3167870" cy="4820988"/>
           </a:xfrm>
           <a:prstGeom prst="rect">
             <a:avLst/>
@@ -7659,10 +7594,10 @@
       </p:pic>
       <p:pic>
         <p:nvPicPr>
-          <p:cNvPr id="13" name="Picture 12">
-            <a:extLst>
-              <a:ext uri="{FF2B5EF4-FFF2-40B4-BE49-F238E27FC236}">
-                <a16:creationId xmlns:a16="http://schemas.microsoft.com/office/drawing/2014/main" id="{33AE8AFA-F230-0985-1543-FC10FB105775}"/>
+          <p:cNvPr id="11" name="Picture 10">
+            <a:extLst>
+              <a:ext uri="{FF2B5EF4-FFF2-40B4-BE49-F238E27FC236}">
+                <a16:creationId xmlns:a16="http://schemas.microsoft.com/office/drawing/2014/main" id="{3569B3D7-E3B3-BFF3-41B5-4B217BE6DE75}"/>
               </a:ext>
             </a:extLst>
           </p:cNvPr>
@@ -7679,8 +7614,158 @@
         </p:blipFill>
         <p:spPr>
           <a:xfrm>
-            <a:off x="3468702" y="215109"/>
-            <a:ext cx="7545767" cy="1602115"/>
+            <a:off x="4713671" y="7201585"/>
+            <a:ext cx="2105235" cy="4820989"/>
+          </a:xfrm>
+          <a:prstGeom prst="rect">
+            <a:avLst/>
+          </a:prstGeom>
+        </p:spPr>
+      </p:pic>
+      <p:pic>
+        <p:nvPicPr>
+          <p:cNvPr id="25" name="Picture 24">
+            <a:extLst>
+              <a:ext uri="{FF2B5EF4-FFF2-40B4-BE49-F238E27FC236}">
+                <a16:creationId xmlns:a16="http://schemas.microsoft.com/office/drawing/2014/main" id="{AEBBC3D8-824E-953D-58DC-69C533031A9E}"/>
+              </a:ext>
+            </a:extLst>
+          </p:cNvPr>
+          <p:cNvPicPr>
+            <a:picLocks noChangeAspect="1"/>
+          </p:cNvPicPr>
+          <p:nvPr/>
+        </p:nvPicPr>
+        <p:blipFill>
+          <a:blip r:embed="rId4"/>
+          <a:stretch>
+            <a:fillRect/>
+          </a:stretch>
+        </p:blipFill>
+        <p:spPr>
+          <a:xfrm>
+            <a:off x="13816314" y="211040"/>
+            <a:ext cx="2016403" cy="5676951"/>
+          </a:xfrm>
+          <a:prstGeom prst="rect">
+            <a:avLst/>
+          </a:prstGeom>
+        </p:spPr>
+      </p:pic>
+      <p:pic>
+        <p:nvPicPr>
+          <p:cNvPr id="3" name="Picture 2">
+            <a:extLst>
+              <a:ext uri="{FF2B5EF4-FFF2-40B4-BE49-F238E27FC236}">
+                <a16:creationId xmlns:a16="http://schemas.microsoft.com/office/drawing/2014/main" id="{0B5E31B6-C73B-AA2B-8CE8-D7B376F16687}"/>
+              </a:ext>
+            </a:extLst>
+          </p:cNvPr>
+          <p:cNvPicPr>
+            <a:picLocks noChangeAspect="1"/>
+          </p:cNvPicPr>
+          <p:nvPr/>
+        </p:nvPicPr>
+        <p:blipFill>
+          <a:blip r:embed="rId5"/>
+          <a:stretch>
+            <a:fillRect/>
+          </a:stretch>
+        </p:blipFill>
+        <p:spPr>
+          <a:xfrm>
+            <a:off x="-2974806" y="-2993410"/>
+            <a:ext cx="4077269" cy="1152686"/>
+          </a:xfrm>
+          <a:prstGeom prst="rect">
+            <a:avLst/>
+          </a:prstGeom>
+        </p:spPr>
+      </p:pic>
+      <p:pic>
+        <p:nvPicPr>
+          <p:cNvPr id="4" name="Picture 3">
+            <a:extLst>
+              <a:ext uri="{FF2B5EF4-FFF2-40B4-BE49-F238E27FC236}">
+                <a16:creationId xmlns:a16="http://schemas.microsoft.com/office/drawing/2014/main" id="{FE9671B7-ADB0-7DF0-7C60-DC3C7DC3A014}"/>
+              </a:ext>
+            </a:extLst>
+          </p:cNvPr>
+          <p:cNvPicPr>
+            <a:picLocks noChangeAspect="1"/>
+          </p:cNvPicPr>
+          <p:nvPr/>
+        </p:nvPicPr>
+        <p:blipFill>
+          <a:blip r:embed="rId6"/>
+          <a:stretch>
+            <a:fillRect/>
+          </a:stretch>
+        </p:blipFill>
+        <p:spPr>
+          <a:xfrm>
+            <a:off x="541971" y="37204"/>
+            <a:ext cx="2693558" cy="6858000"/>
+          </a:xfrm>
+          <a:prstGeom prst="rect">
+            <a:avLst/>
+          </a:prstGeom>
+        </p:spPr>
+      </p:pic>
+      <p:pic>
+        <p:nvPicPr>
+          <p:cNvPr id="7" name="Picture 6">
+            <a:extLst>
+              <a:ext uri="{FF2B5EF4-FFF2-40B4-BE49-F238E27FC236}">
+                <a16:creationId xmlns:a16="http://schemas.microsoft.com/office/drawing/2014/main" id="{7E82C991-B79E-F258-C9F0-8674C6EFA476}"/>
+              </a:ext>
+            </a:extLst>
+          </p:cNvPr>
+          <p:cNvPicPr>
+            <a:picLocks noChangeAspect="1"/>
+          </p:cNvPicPr>
+          <p:nvPr/>
+        </p:nvPicPr>
+        <p:blipFill>
+          <a:blip r:embed="rId7"/>
+          <a:stretch>
+            <a:fillRect/>
+          </a:stretch>
+        </p:blipFill>
+        <p:spPr>
+          <a:xfrm>
+            <a:off x="4713671" y="37204"/>
+            <a:ext cx="2330950" cy="6858000"/>
+          </a:xfrm>
+          <a:prstGeom prst="rect">
+            <a:avLst/>
+          </a:prstGeom>
+        </p:spPr>
+      </p:pic>
+      <p:pic>
+        <p:nvPicPr>
+          <p:cNvPr id="10" name="Picture 9">
+            <a:extLst>
+              <a:ext uri="{FF2B5EF4-FFF2-40B4-BE49-F238E27FC236}">
+                <a16:creationId xmlns:a16="http://schemas.microsoft.com/office/drawing/2014/main" id="{8840ADE1-E7AF-9E7D-EC69-A69E0CDC1087}"/>
+              </a:ext>
+            </a:extLst>
+          </p:cNvPr>
+          <p:cNvPicPr>
+            <a:picLocks noChangeAspect="1"/>
+          </p:cNvPicPr>
+          <p:nvPr/>
+        </p:nvPicPr>
+        <p:blipFill>
+          <a:blip r:embed="rId8"/>
+          <a:stretch>
+            <a:fillRect/>
+          </a:stretch>
+        </p:blipFill>
+        <p:spPr>
+          <a:xfrm>
+            <a:off x="8404835" y="-6573"/>
+            <a:ext cx="2476942" cy="6858000"/>
           </a:xfrm>
           <a:prstGeom prst="rect">
             <a:avLst/>
@@ -7690,7 +7775,7 @@
     </p:spTree>
     <p:extLst>
       <p:ext uri="{BB962C8B-B14F-4D97-AF65-F5344CB8AC3E}">
-        <p14:creationId xmlns:p14="http://schemas.microsoft.com/office/powerpoint/2010/main" val="3108495803"/>
+        <p14:creationId xmlns:p14="http://schemas.microsoft.com/office/powerpoint/2010/main" val="1012324529"/>
       </p:ext>
     </p:extLst>
   </p:cSld>
@@ -7741,10 +7826,10 @@
       </p:grpSpPr>
       <p:pic>
         <p:nvPicPr>
-          <p:cNvPr id="7" name="Picture 6">
-            <a:extLst>
-              <a:ext uri="{FF2B5EF4-FFF2-40B4-BE49-F238E27FC236}">
-                <a16:creationId xmlns:a16="http://schemas.microsoft.com/office/drawing/2014/main" id="{7E82C991-B79E-F258-C9F0-8674C6EFA476}"/>
+          <p:cNvPr id="4" name="Picture 3">
+            <a:extLst>
+              <a:ext uri="{FF2B5EF4-FFF2-40B4-BE49-F238E27FC236}">
+                <a16:creationId xmlns:a16="http://schemas.microsoft.com/office/drawing/2014/main" id="{FE9671B7-ADB0-7DF0-7C60-DC3C7DC3A014}"/>
               </a:ext>
             </a:extLst>
           </p:cNvPr>
@@ -7761,8 +7846,8 @@
         </p:blipFill>
         <p:spPr>
           <a:xfrm>
-            <a:off x="292142" y="0"/>
-            <a:ext cx="2330950" cy="6858000"/>
+            <a:off x="541971" y="37204"/>
+            <a:ext cx="2693558" cy="6858000"/>
           </a:xfrm>
           <a:prstGeom prst="rect">
             <a:avLst/>
@@ -7771,10 +7856,10 @@
       </p:pic>
       <p:pic>
         <p:nvPicPr>
-          <p:cNvPr id="3" name="Picture 2">
-            <a:extLst>
-              <a:ext uri="{FF2B5EF4-FFF2-40B4-BE49-F238E27FC236}">
-                <a16:creationId xmlns:a16="http://schemas.microsoft.com/office/drawing/2014/main" id="{D320AAD1-2F56-6B0A-C2B8-BB9E53D8442C}"/>
+          <p:cNvPr id="13" name="Picture 12">
+            <a:extLst>
+              <a:ext uri="{FF2B5EF4-FFF2-40B4-BE49-F238E27FC236}">
+                <a16:creationId xmlns:a16="http://schemas.microsoft.com/office/drawing/2014/main" id="{33AE8AFA-F230-0985-1543-FC10FB105775}"/>
               </a:ext>
             </a:extLst>
           </p:cNvPr>
@@ -7791,107 +7876,18 @@
         </p:blipFill>
         <p:spPr>
           <a:xfrm>
-            <a:off x="2623092" y="1509407"/>
-            <a:ext cx="8053231" cy="3186800"/>
+            <a:off x="3468702" y="215109"/>
+            <a:ext cx="7545767" cy="1602115"/>
           </a:xfrm>
           <a:prstGeom prst="rect">
             <a:avLst/>
           </a:prstGeom>
         </p:spPr>
       </p:pic>
-      <p:pic>
-        <p:nvPicPr>
-          <p:cNvPr id="5" name="Picture 4">
-            <a:extLst>
-              <a:ext uri="{FF2B5EF4-FFF2-40B4-BE49-F238E27FC236}">
-                <a16:creationId xmlns:a16="http://schemas.microsoft.com/office/drawing/2014/main" id="{D698BB77-5DCE-C629-30C7-58E94BCE044C}"/>
-              </a:ext>
-            </a:extLst>
-          </p:cNvPr>
-          <p:cNvPicPr>
-            <a:picLocks noChangeAspect="1"/>
-          </p:cNvPicPr>
-          <p:nvPr/>
-        </p:nvPicPr>
-        <p:blipFill>
-          <a:blip r:embed="rId4"/>
-          <a:stretch>
-            <a:fillRect/>
-          </a:stretch>
-        </p:blipFill>
-        <p:spPr>
-          <a:xfrm>
-            <a:off x="10269653" y="1003569"/>
-            <a:ext cx="1835881" cy="4724400"/>
-          </a:xfrm>
-          <a:prstGeom prst="rect">
-            <a:avLst/>
-          </a:prstGeom>
-        </p:spPr>
-      </p:pic>
-      <p:sp>
-        <p:nvSpPr>
-          <p:cNvPr id="8" name="TextBox 7">
-            <a:extLst>
-              <a:ext uri="{FF2B5EF4-FFF2-40B4-BE49-F238E27FC236}">
-                <a16:creationId xmlns:a16="http://schemas.microsoft.com/office/drawing/2014/main" id="{C83A9E55-A52D-8834-402B-3BBCD14B1864}"/>
-              </a:ext>
-            </a:extLst>
-          </p:cNvPr>
-          <p:cNvSpPr txBox="1"/>
-          <p:nvPr/>
-        </p:nvSpPr>
-        <p:spPr>
-          <a:xfrm>
-            <a:off x="3884579" y="5564221"/>
-            <a:ext cx="5350212" cy="584775"/>
-          </a:xfrm>
-          <a:prstGeom prst="rect">
-            <a:avLst/>
-          </a:prstGeom>
-          <a:solidFill>
-            <a:schemeClr val="tx1"/>
-          </a:solidFill>
-        </p:spPr>
-        <p:txBody>
-          <a:bodyPr wrap="square" rtlCol="0">
-            <a:spAutoFit/>
-          </a:bodyPr>
-          <a:lstStyle/>
-          <a:p>
-            <a:r>
-              <a:rPr lang="en-US" sz="3200" dirty="0">
-                <a:solidFill>
-                  <a:schemeClr val="tx2">
-                    <a:lumMod val="25000"/>
-                    <a:lumOff val="75000"/>
-                  </a:schemeClr>
-                </a:solidFill>
-                <a:hlinkClick r:id="rId5">
-                  <a:extLst>
-                    <a:ext uri="{A12FA001-AC4F-418D-AE19-62706E023703}">
-                      <ahyp:hlinkClr xmlns:ahyp="http://schemas.microsoft.com/office/drawing/2018/hyperlinkcolor" val="tx"/>
-                    </a:ext>
-                  </a:extLst>
-                </a:hlinkClick>
-              </a:rPr>
-              <a:t>montecarlorpp.pdf (lbl.gov)</a:t>
-            </a:r>
-            <a:endParaRPr lang="en-US" sz="3200" dirty="0">
-              <a:solidFill>
-                <a:schemeClr val="tx2">
-                  <a:lumMod val="25000"/>
-                  <a:lumOff val="75000"/>
-                </a:schemeClr>
-              </a:solidFill>
-            </a:endParaRPr>
-          </a:p>
-        </p:txBody>
-      </p:sp>
     </p:spTree>
     <p:extLst>
       <p:ext uri="{BB962C8B-B14F-4D97-AF65-F5344CB8AC3E}">
-        <p14:creationId xmlns:p14="http://schemas.microsoft.com/office/powerpoint/2010/main" val="2632909756"/>
+        <p14:creationId xmlns:p14="http://schemas.microsoft.com/office/powerpoint/2010/main" val="3108495803"/>
       </p:ext>
     </p:extLst>
   </p:cSld>
@@ -7972,10 +7968,10 @@
       </p:pic>
       <p:pic>
         <p:nvPicPr>
-          <p:cNvPr id="4" name="Picture 3">
-            <a:extLst>
-              <a:ext uri="{FF2B5EF4-FFF2-40B4-BE49-F238E27FC236}">
-                <a16:creationId xmlns:a16="http://schemas.microsoft.com/office/drawing/2014/main" id="{4738E260-A72D-F907-97A2-1858A16F37A6}"/>
+          <p:cNvPr id="3" name="Picture 2">
+            <a:extLst>
+              <a:ext uri="{FF2B5EF4-FFF2-40B4-BE49-F238E27FC236}">
+                <a16:creationId xmlns:a16="http://schemas.microsoft.com/office/drawing/2014/main" id="{D320AAD1-2F56-6B0A-C2B8-BB9E53D8442C}"/>
               </a:ext>
             </a:extLst>
           </p:cNvPr>
@@ -7992,31 +7988,120 @@
         </p:blipFill>
         <p:spPr>
           <a:xfrm>
-            <a:off x="4362736" y="1319826"/>
-            <a:ext cx="5506978" cy="4531849"/>
+            <a:off x="2623092" y="1509407"/>
+            <a:ext cx="8053231" cy="3186800"/>
           </a:xfrm>
           <a:prstGeom prst="rect">
             <a:avLst/>
           </a:prstGeom>
         </p:spPr>
       </p:pic>
+      <p:pic>
+        <p:nvPicPr>
+          <p:cNvPr id="5" name="Picture 4">
+            <a:extLst>
+              <a:ext uri="{FF2B5EF4-FFF2-40B4-BE49-F238E27FC236}">
+                <a16:creationId xmlns:a16="http://schemas.microsoft.com/office/drawing/2014/main" id="{D698BB77-5DCE-C629-30C7-58E94BCE044C}"/>
+              </a:ext>
+            </a:extLst>
+          </p:cNvPr>
+          <p:cNvPicPr>
+            <a:picLocks noChangeAspect="1"/>
+          </p:cNvPicPr>
+          <p:nvPr/>
+        </p:nvPicPr>
+        <p:blipFill>
+          <a:blip r:embed="rId4"/>
+          <a:stretch>
+            <a:fillRect/>
+          </a:stretch>
+        </p:blipFill>
+        <p:spPr>
+          <a:xfrm>
+            <a:off x="10269653" y="1003569"/>
+            <a:ext cx="1835881" cy="4724400"/>
+          </a:xfrm>
+          <a:prstGeom prst="rect">
+            <a:avLst/>
+          </a:prstGeom>
+        </p:spPr>
+      </p:pic>
+      <p:sp>
+        <p:nvSpPr>
+          <p:cNvPr id="8" name="TextBox 7">
+            <a:extLst>
+              <a:ext uri="{FF2B5EF4-FFF2-40B4-BE49-F238E27FC236}">
+                <a16:creationId xmlns:a16="http://schemas.microsoft.com/office/drawing/2014/main" id="{C83A9E55-A52D-8834-402B-3BBCD14B1864}"/>
+              </a:ext>
+            </a:extLst>
+          </p:cNvPr>
+          <p:cNvSpPr txBox="1"/>
+          <p:nvPr/>
+        </p:nvSpPr>
+        <p:spPr>
+          <a:xfrm>
+            <a:off x="3884579" y="5564221"/>
+            <a:ext cx="5350212" cy="584775"/>
+          </a:xfrm>
+          <a:prstGeom prst="rect">
+            <a:avLst/>
+          </a:prstGeom>
+          <a:solidFill>
+            <a:schemeClr val="tx1"/>
+          </a:solidFill>
+        </p:spPr>
+        <p:txBody>
+          <a:bodyPr wrap="square" rtlCol="0">
+            <a:spAutoFit/>
+          </a:bodyPr>
+          <a:lstStyle/>
+          <a:p>
+            <a:r>
+              <a:rPr lang="en-US" sz="3200" dirty="0">
+                <a:solidFill>
+                  <a:schemeClr val="tx2">
+                    <a:lumMod val="25000"/>
+                    <a:lumOff val="75000"/>
+                  </a:schemeClr>
+                </a:solidFill>
+                <a:hlinkClick r:id="rId5">
+                  <a:extLst>
+                    <a:ext uri="{A12FA001-AC4F-418D-AE19-62706E023703}">
+                      <ahyp:hlinkClr xmlns:ahyp="http://schemas.microsoft.com/office/drawing/2018/hyperlinkcolor" val="tx"/>
+                    </a:ext>
+                  </a:extLst>
+                </a:hlinkClick>
+              </a:rPr>
+              <a:t>montecarlorpp.pdf (lbl.gov)</a:t>
+            </a:r>
+            <a:endParaRPr lang="en-US" sz="3200" dirty="0">
+              <a:solidFill>
+                <a:schemeClr val="tx2">
+                  <a:lumMod val="25000"/>
+                  <a:lumOff val="75000"/>
+                </a:schemeClr>
+              </a:solidFill>
+            </a:endParaRPr>
+          </a:p>
+        </p:txBody>
+      </p:sp>
     </p:spTree>
     <p:extLst>
       <p:ext uri="{BB962C8B-B14F-4D97-AF65-F5344CB8AC3E}">
-        <p14:creationId xmlns:p14="http://schemas.microsoft.com/office/powerpoint/2010/main" val="3041507495"/>
+        <p14:creationId xmlns:p14="http://schemas.microsoft.com/office/powerpoint/2010/main" val="2632909756"/>
       </p:ext>
     </p:extLst>
   </p:cSld>
   <p:clrMapOvr>
     <a:masterClrMapping/>
   </p:clrMapOvr>
-  <mc:AlternateContent xmlns:mc="http://schemas.openxmlformats.org/markup-compatibility/2006">
-    <mc:Choice xmlns:p159="http://schemas.microsoft.com/office/powerpoint/2015/09/main" Requires="p159">
+  <mc:AlternateContent xmlns:mc="http://schemas.openxmlformats.org/markup-compatibility/2006" xmlns:p159="http://schemas.microsoft.com/office/powerpoint/2015/09/main">
+    <mc:Choice Requires="p159">
       <p:transition xmlns:p14="http://schemas.microsoft.com/office/powerpoint/2010/main" spd="slow" p14:dur="2000">
         <p159:morph option="byObject"/>
       </p:transition>
     </mc:Choice>
-    <mc:Fallback>
+    <mc:Fallback xmlns="">
       <p:transition spd="slow">
         <p:fade/>
       </p:transition>
@@ -8054,10 +8139,10 @@
       </p:grpSpPr>
       <p:pic>
         <p:nvPicPr>
-          <p:cNvPr id="3" name="Picture 2" descr="A graph with a line&#10;&#10;Description automatically generated with medium confidence">
-            <a:extLst>
-              <a:ext uri="{FF2B5EF4-FFF2-40B4-BE49-F238E27FC236}">
-                <a16:creationId xmlns:a16="http://schemas.microsoft.com/office/drawing/2014/main" id="{98DB96E5-7760-2A1E-F854-3F33051A88BB}"/>
+          <p:cNvPr id="7" name="Picture 6">
+            <a:extLst>
+              <a:ext uri="{FF2B5EF4-FFF2-40B4-BE49-F238E27FC236}">
+                <a16:creationId xmlns:a16="http://schemas.microsoft.com/office/drawing/2014/main" id="{7E82C991-B79E-F258-C9F0-8674C6EFA476}"/>
               </a:ext>
             </a:extLst>
           </p:cNvPr>
@@ -8067,21 +8152,45 @@
           <p:nvPr/>
         </p:nvPicPr>
         <p:blipFill>
-          <a:blip r:embed="rId3">
-            <a:extLst>
-              <a:ext uri="{28A0092B-C50C-407E-A947-70E740481C1C}">
-                <a14:useLocalDpi xmlns:a14="http://schemas.microsoft.com/office/drawing/2010/main" val="0"/>
-              </a:ext>
-            </a:extLst>
-          </a:blip>
+          <a:blip r:embed="rId2"/>
           <a:stretch>
             <a:fillRect/>
           </a:stretch>
         </p:blipFill>
         <p:spPr>
           <a:xfrm>
-            <a:off x="200781" y="481390"/>
-            <a:ext cx="11790438" cy="5895219"/>
+            <a:off x="292142" y="0"/>
+            <a:ext cx="2330950" cy="6858000"/>
+          </a:xfrm>
+          <a:prstGeom prst="rect">
+            <a:avLst/>
+          </a:prstGeom>
+        </p:spPr>
+      </p:pic>
+      <p:pic>
+        <p:nvPicPr>
+          <p:cNvPr id="4" name="Picture 3">
+            <a:extLst>
+              <a:ext uri="{FF2B5EF4-FFF2-40B4-BE49-F238E27FC236}">
+                <a16:creationId xmlns:a16="http://schemas.microsoft.com/office/drawing/2014/main" id="{4738E260-A72D-F907-97A2-1858A16F37A6}"/>
+              </a:ext>
+            </a:extLst>
+          </p:cNvPr>
+          <p:cNvPicPr>
+            <a:picLocks noChangeAspect="1"/>
+          </p:cNvPicPr>
+          <p:nvPr/>
+        </p:nvPicPr>
+        <p:blipFill>
+          <a:blip r:embed="rId3"/>
+          <a:stretch>
+            <a:fillRect/>
+          </a:stretch>
+        </p:blipFill>
+        <p:spPr>
+          <a:xfrm>
+            <a:off x="4362736" y="1319826"/>
+            <a:ext cx="5506978" cy="4531849"/>
           </a:xfrm>
           <a:prstGeom prst="rect">
             <a:avLst/>
@@ -8091,20 +8200,20 @@
     </p:spTree>
     <p:extLst>
       <p:ext uri="{BB962C8B-B14F-4D97-AF65-F5344CB8AC3E}">
-        <p14:creationId xmlns:p14="http://schemas.microsoft.com/office/powerpoint/2010/main" val="4123660323"/>
+        <p14:creationId xmlns:p14="http://schemas.microsoft.com/office/powerpoint/2010/main" val="3041507495"/>
       </p:ext>
     </p:extLst>
   </p:cSld>
   <p:clrMapOvr>
     <a:masterClrMapping/>
   </p:clrMapOvr>
-  <mc:AlternateContent xmlns:mc="http://schemas.openxmlformats.org/markup-compatibility/2006">
-    <mc:Choice xmlns:p159="http://schemas.microsoft.com/office/powerpoint/2015/09/main" Requires="p159">
+  <mc:AlternateContent xmlns:mc="http://schemas.openxmlformats.org/markup-compatibility/2006" xmlns:p159="http://schemas.microsoft.com/office/powerpoint/2015/09/main">
+    <mc:Choice Requires="p159">
       <p:transition xmlns:p14="http://schemas.microsoft.com/office/powerpoint/2010/main" spd="slow" p14:dur="2000">
         <p159:morph option="byObject"/>
       </p:transition>
     </mc:Choice>
-    <mc:Fallback>
+    <mc:Fallback xmlns="">
       <p:transition spd="slow">
         <p:fade/>
       </p:transition>
@@ -8142,10 +8251,10 @@
       </p:grpSpPr>
       <p:pic>
         <p:nvPicPr>
-          <p:cNvPr id="7" name="Picture 6">
-            <a:extLst>
-              <a:ext uri="{FF2B5EF4-FFF2-40B4-BE49-F238E27FC236}">
-                <a16:creationId xmlns:a16="http://schemas.microsoft.com/office/drawing/2014/main" id="{7E82C991-B79E-F258-C9F0-8674C6EFA476}"/>
+          <p:cNvPr id="3" name="Picture 2" descr="A graph with a line&#10;&#10;Description automatically generated with medium confidence">
+            <a:extLst>
+              <a:ext uri="{FF2B5EF4-FFF2-40B4-BE49-F238E27FC236}">
+                <a16:creationId xmlns:a16="http://schemas.microsoft.com/office/drawing/2014/main" id="{98DB96E5-7760-2A1E-F854-3F33051A88BB}"/>
               </a:ext>
             </a:extLst>
           </p:cNvPr>
@@ -8155,197 +8264,31 @@
           <p:nvPr/>
         </p:nvPicPr>
         <p:blipFill>
-          <a:blip r:embed="rId2"/>
+          <a:blip r:embed="rId3">
+            <a:extLst>
+              <a:ext uri="{28A0092B-C50C-407E-A947-70E740481C1C}">
+                <a14:useLocalDpi xmlns:a14="http://schemas.microsoft.com/office/drawing/2010/main" val="0"/>
+              </a:ext>
+            </a:extLst>
+          </a:blip>
           <a:stretch>
             <a:fillRect/>
           </a:stretch>
         </p:blipFill>
         <p:spPr>
           <a:xfrm>
-            <a:off x="292142" y="0"/>
-            <a:ext cx="2330950" cy="6858000"/>
+            <a:off x="200781" y="481390"/>
+            <a:ext cx="11790438" cy="5895219"/>
           </a:xfrm>
           <a:prstGeom prst="rect">
             <a:avLst/>
           </a:prstGeom>
         </p:spPr>
       </p:pic>
-      <p:pic>
-        <p:nvPicPr>
-          <p:cNvPr id="6" name="Picture 5">
-            <a:extLst>
-              <a:ext uri="{FF2B5EF4-FFF2-40B4-BE49-F238E27FC236}">
-                <a16:creationId xmlns:a16="http://schemas.microsoft.com/office/drawing/2014/main" id="{EED6B712-5959-227F-DD92-E47B8ADA6792}"/>
-              </a:ext>
-            </a:extLst>
-          </p:cNvPr>
-          <p:cNvPicPr>
-            <a:picLocks noChangeAspect="1"/>
-          </p:cNvPicPr>
-          <p:nvPr/>
-        </p:nvPicPr>
-        <p:blipFill>
-          <a:blip r:embed="rId3"/>
-          <a:stretch>
-            <a:fillRect/>
-          </a:stretch>
-        </p:blipFill>
-        <p:spPr>
-          <a:xfrm>
-            <a:off x="3030437" y="232455"/>
-            <a:ext cx="2542773" cy="1450752"/>
-          </a:xfrm>
-          <a:prstGeom prst="rect">
-            <a:avLst/>
-          </a:prstGeom>
-        </p:spPr>
-      </p:pic>
-      <p:pic>
-        <p:nvPicPr>
-          <p:cNvPr id="9" name="Picture 8">
-            <a:extLst>
-              <a:ext uri="{FF2B5EF4-FFF2-40B4-BE49-F238E27FC236}">
-                <a16:creationId xmlns:a16="http://schemas.microsoft.com/office/drawing/2014/main" id="{FCF738C0-1845-0198-8001-C47173B82CA7}"/>
-              </a:ext>
-            </a:extLst>
-          </p:cNvPr>
-          <p:cNvPicPr>
-            <a:picLocks noChangeAspect="1"/>
-          </p:cNvPicPr>
-          <p:nvPr/>
-        </p:nvPicPr>
-        <p:blipFill>
-          <a:blip r:embed="rId4"/>
-          <a:stretch>
-            <a:fillRect/>
-          </a:stretch>
-        </p:blipFill>
-        <p:spPr>
-          <a:xfrm>
-            <a:off x="5980555" y="232455"/>
-            <a:ext cx="5034695" cy="1450752"/>
-          </a:xfrm>
-          <a:prstGeom prst="rect">
-            <a:avLst/>
-          </a:prstGeom>
-        </p:spPr>
-      </p:pic>
-      <p:pic>
-        <p:nvPicPr>
-          <p:cNvPr id="15" name="Picture 14">
-            <a:extLst>
-              <a:ext uri="{FF2B5EF4-FFF2-40B4-BE49-F238E27FC236}">
-                <a16:creationId xmlns:a16="http://schemas.microsoft.com/office/drawing/2014/main" id="{33BD20A9-6D47-BA85-5265-E1B5910AF909}"/>
-              </a:ext>
-            </a:extLst>
-          </p:cNvPr>
-          <p:cNvPicPr>
-            <a:picLocks noChangeAspect="1"/>
-          </p:cNvPicPr>
-          <p:nvPr/>
-        </p:nvPicPr>
-        <p:blipFill>
-          <a:blip r:embed="rId5"/>
-          <a:stretch>
-            <a:fillRect/>
-          </a:stretch>
-        </p:blipFill>
-        <p:spPr>
-          <a:xfrm>
-            <a:off x="2760903" y="1936775"/>
-            <a:ext cx="5114565" cy="3539817"/>
-          </a:xfrm>
-          <a:prstGeom prst="rect">
-            <a:avLst/>
-          </a:prstGeom>
-        </p:spPr>
-      </p:pic>
-      <p:pic>
-        <p:nvPicPr>
-          <p:cNvPr id="17" name="Picture 16">
-            <a:extLst>
-              <a:ext uri="{FF2B5EF4-FFF2-40B4-BE49-F238E27FC236}">
-                <a16:creationId xmlns:a16="http://schemas.microsoft.com/office/drawing/2014/main" id="{C7F1089A-C7A3-3B19-A75E-2E5099BC28C1}"/>
-              </a:ext>
-            </a:extLst>
-          </p:cNvPr>
-          <p:cNvPicPr>
-            <a:picLocks noChangeAspect="1"/>
-          </p:cNvPicPr>
-          <p:nvPr/>
-        </p:nvPicPr>
-        <p:blipFill rotWithShape="1">
-          <a:blip r:embed="rId6"/>
-          <a:srcRect r="29419"/>
-          <a:stretch/>
-        </p:blipFill>
-        <p:spPr>
-          <a:xfrm>
-            <a:off x="8025307" y="1979163"/>
-            <a:ext cx="3780981" cy="3455043"/>
-          </a:xfrm>
-          <a:prstGeom prst="rect">
-            <a:avLst/>
-          </a:prstGeom>
-        </p:spPr>
-      </p:pic>
-      <p:sp>
-        <p:nvSpPr>
-          <p:cNvPr id="2" name="Action Button: Help 1">
-            <a:hlinkClick r:id="" action="ppaction://noaction" highlightClick="1"/>
-            <a:extLst>
-              <a:ext uri="{FF2B5EF4-FFF2-40B4-BE49-F238E27FC236}">
-                <a16:creationId xmlns:a16="http://schemas.microsoft.com/office/drawing/2014/main" id="{7E6FA0EB-BBAD-65AF-1CD7-D7474A95B760}"/>
-              </a:ext>
-            </a:extLst>
-          </p:cNvPr>
-          <p:cNvSpPr/>
-          <p:nvPr/>
-        </p:nvSpPr>
-        <p:spPr>
-          <a:xfrm>
-            <a:off x="10548176" y="5680953"/>
-            <a:ext cx="1125015" cy="1074984"/>
-          </a:xfrm>
-          <a:prstGeom prst="actionButtonHelp">
-            <a:avLst/>
-          </a:prstGeom>
-          <a:solidFill>
-            <a:srgbClr val="FF0000"/>
-          </a:solidFill>
-          <a:ln>
-            <a:solidFill>
-              <a:schemeClr val="tx1"/>
-            </a:solidFill>
-          </a:ln>
-        </p:spPr>
-        <p:style>
-          <a:lnRef idx="2">
-            <a:schemeClr val="dk1"/>
-          </a:lnRef>
-          <a:fillRef idx="1">
-            <a:schemeClr val="lt1"/>
-          </a:fillRef>
-          <a:effectRef idx="0">
-            <a:schemeClr val="dk1"/>
-          </a:effectRef>
-          <a:fontRef idx="minor">
-            <a:schemeClr val="dk1"/>
-          </a:fontRef>
-        </p:style>
-        <p:txBody>
-          <a:bodyPr rtlCol="0" anchor="ctr"/>
-          <a:lstStyle/>
-          <a:p>
-            <a:pPr algn="ctr"/>
-            <a:endParaRPr lang="en-US"/>
-          </a:p>
-        </p:txBody>
-      </p:sp>
     </p:spTree>
     <p:extLst>
       <p:ext uri="{BB962C8B-B14F-4D97-AF65-F5344CB8AC3E}">
-        <p14:creationId xmlns:p14="http://schemas.microsoft.com/office/powerpoint/2010/main" val="3805769938"/>
+        <p14:creationId xmlns:p14="http://schemas.microsoft.com/office/powerpoint/2010/main" val="4123660323"/>
       </p:ext>
     </p:extLst>
   </p:cSld>
@@ -8426,10 +8369,10 @@
       </p:pic>
       <p:pic>
         <p:nvPicPr>
-          <p:cNvPr id="3" name="Picture 2">
-            <a:extLst>
-              <a:ext uri="{FF2B5EF4-FFF2-40B4-BE49-F238E27FC236}">
-                <a16:creationId xmlns:a16="http://schemas.microsoft.com/office/drawing/2014/main" id="{BFE4ACC3-B34F-5CF7-D093-CE6A5BC2B438}"/>
+          <p:cNvPr id="6" name="Picture 5">
+            <a:extLst>
+              <a:ext uri="{FF2B5EF4-FFF2-40B4-BE49-F238E27FC236}">
+                <a16:creationId xmlns:a16="http://schemas.microsoft.com/office/drawing/2014/main" id="{EED6B712-5959-227F-DD92-E47B8ADA6792}"/>
               </a:ext>
             </a:extLst>
           </p:cNvPr>
@@ -8446,18 +8389,160 @@
         </p:blipFill>
         <p:spPr>
           <a:xfrm>
-            <a:off x="3471010" y="778212"/>
-            <a:ext cx="7226624" cy="5612859"/>
+            <a:off x="3030437" y="232455"/>
+            <a:ext cx="2542773" cy="1450752"/>
           </a:xfrm>
           <a:prstGeom prst="rect">
             <a:avLst/>
           </a:prstGeom>
         </p:spPr>
       </p:pic>
+      <p:pic>
+        <p:nvPicPr>
+          <p:cNvPr id="9" name="Picture 8">
+            <a:extLst>
+              <a:ext uri="{FF2B5EF4-FFF2-40B4-BE49-F238E27FC236}">
+                <a16:creationId xmlns:a16="http://schemas.microsoft.com/office/drawing/2014/main" id="{FCF738C0-1845-0198-8001-C47173B82CA7}"/>
+              </a:ext>
+            </a:extLst>
+          </p:cNvPr>
+          <p:cNvPicPr>
+            <a:picLocks noChangeAspect="1"/>
+          </p:cNvPicPr>
+          <p:nvPr/>
+        </p:nvPicPr>
+        <p:blipFill>
+          <a:blip r:embed="rId4"/>
+          <a:stretch>
+            <a:fillRect/>
+          </a:stretch>
+        </p:blipFill>
+        <p:spPr>
+          <a:xfrm>
+            <a:off x="5980555" y="232455"/>
+            <a:ext cx="5034695" cy="1450752"/>
+          </a:xfrm>
+          <a:prstGeom prst="rect">
+            <a:avLst/>
+          </a:prstGeom>
+        </p:spPr>
+      </p:pic>
+      <p:pic>
+        <p:nvPicPr>
+          <p:cNvPr id="15" name="Picture 14">
+            <a:extLst>
+              <a:ext uri="{FF2B5EF4-FFF2-40B4-BE49-F238E27FC236}">
+                <a16:creationId xmlns:a16="http://schemas.microsoft.com/office/drawing/2014/main" id="{33BD20A9-6D47-BA85-5265-E1B5910AF909}"/>
+              </a:ext>
+            </a:extLst>
+          </p:cNvPr>
+          <p:cNvPicPr>
+            <a:picLocks noChangeAspect="1"/>
+          </p:cNvPicPr>
+          <p:nvPr/>
+        </p:nvPicPr>
+        <p:blipFill>
+          <a:blip r:embed="rId5"/>
+          <a:stretch>
+            <a:fillRect/>
+          </a:stretch>
+        </p:blipFill>
+        <p:spPr>
+          <a:xfrm>
+            <a:off x="2760903" y="1936775"/>
+            <a:ext cx="5114565" cy="3539817"/>
+          </a:xfrm>
+          <a:prstGeom prst="rect">
+            <a:avLst/>
+          </a:prstGeom>
+        </p:spPr>
+      </p:pic>
+      <p:pic>
+        <p:nvPicPr>
+          <p:cNvPr id="17" name="Picture 16">
+            <a:extLst>
+              <a:ext uri="{FF2B5EF4-FFF2-40B4-BE49-F238E27FC236}">
+                <a16:creationId xmlns:a16="http://schemas.microsoft.com/office/drawing/2014/main" id="{C7F1089A-C7A3-3B19-A75E-2E5099BC28C1}"/>
+              </a:ext>
+            </a:extLst>
+          </p:cNvPr>
+          <p:cNvPicPr>
+            <a:picLocks noChangeAspect="1"/>
+          </p:cNvPicPr>
+          <p:nvPr/>
+        </p:nvPicPr>
+        <p:blipFill rotWithShape="1">
+          <a:blip r:embed="rId6"/>
+          <a:srcRect r="29419"/>
+          <a:stretch/>
+        </p:blipFill>
+        <p:spPr>
+          <a:xfrm>
+            <a:off x="8025307" y="1979163"/>
+            <a:ext cx="3780981" cy="3455043"/>
+          </a:xfrm>
+          <a:prstGeom prst="rect">
+            <a:avLst/>
+          </a:prstGeom>
+        </p:spPr>
+      </p:pic>
+      <p:sp>
+        <p:nvSpPr>
+          <p:cNvPr id="2" name="Action Button: Help 1">
+            <a:hlinkClick r:id="" action="ppaction://noaction" highlightClick="1"/>
+            <a:extLst>
+              <a:ext uri="{FF2B5EF4-FFF2-40B4-BE49-F238E27FC236}">
+                <a16:creationId xmlns:a16="http://schemas.microsoft.com/office/drawing/2014/main" id="{7E6FA0EB-BBAD-65AF-1CD7-D7474A95B760}"/>
+              </a:ext>
+            </a:extLst>
+          </p:cNvPr>
+          <p:cNvSpPr/>
+          <p:nvPr/>
+        </p:nvSpPr>
+        <p:spPr>
+          <a:xfrm>
+            <a:off x="10548176" y="5680953"/>
+            <a:ext cx="1125015" cy="1074984"/>
+          </a:xfrm>
+          <a:prstGeom prst="actionButtonHelp">
+            <a:avLst/>
+          </a:prstGeom>
+          <a:solidFill>
+            <a:srgbClr val="FF0000"/>
+          </a:solidFill>
+          <a:ln>
+            <a:solidFill>
+              <a:schemeClr val="tx1"/>
+            </a:solidFill>
+          </a:ln>
+        </p:spPr>
+        <p:style>
+          <a:lnRef idx="2">
+            <a:schemeClr val="dk1"/>
+          </a:lnRef>
+          <a:fillRef idx="1">
+            <a:schemeClr val="lt1"/>
+          </a:fillRef>
+          <a:effectRef idx="0">
+            <a:schemeClr val="dk1"/>
+          </a:effectRef>
+          <a:fontRef idx="minor">
+            <a:schemeClr val="dk1"/>
+          </a:fontRef>
+        </p:style>
+        <p:txBody>
+          <a:bodyPr rtlCol="0" anchor="ctr"/>
+          <a:lstStyle/>
+          <a:p>
+            <a:pPr algn="ctr"/>
+            <a:endParaRPr lang="en-US"/>
+          </a:p>
+        </p:txBody>
+      </p:sp>
     </p:spTree>
     <p:extLst>
       <p:ext uri="{BB962C8B-B14F-4D97-AF65-F5344CB8AC3E}">
-        <p14:creationId xmlns:p14="http://schemas.microsoft.com/office/powerpoint/2010/main" val="373630565"/>
+        <p14:creationId xmlns:p14="http://schemas.microsoft.com/office/powerpoint/2010/main" val="3805769938"/>
       </p:ext>
     </p:extLst>
   </p:cSld>

</xml_diff>

<commit_message>
work i did today
</commit_message>
<xml_diff>
--- a/6-17-24 Meeting Resources/presentation.pptx
+++ b/6-17-24 Meeting Resources/presentation.pptx
@@ -8082,6 +8082,54 @@
                 </a:schemeClr>
               </a:solidFill>
             </a:endParaRPr>
+          </a:p>
+        </p:txBody>
+      </p:sp>
+      <p:sp>
+        <p:nvSpPr>
+          <p:cNvPr id="2" name="TextBox 1">
+            <a:extLst>
+              <a:ext uri="{FF2B5EF4-FFF2-40B4-BE49-F238E27FC236}">
+                <a16:creationId xmlns:a16="http://schemas.microsoft.com/office/drawing/2014/main" id="{07CBCA66-D9C0-73DE-5FB7-D6E160583A72}"/>
+              </a:ext>
+            </a:extLst>
+          </p:cNvPr>
+          <p:cNvSpPr txBox="1"/>
+          <p:nvPr/>
+        </p:nvSpPr>
+        <p:spPr>
+          <a:xfrm>
+            <a:off x="4383314" y="493486"/>
+            <a:ext cx="4034972" cy="369332"/>
+          </a:xfrm>
+          <a:prstGeom prst="rect">
+            <a:avLst/>
+          </a:prstGeom>
+          <a:noFill/>
+        </p:spPr>
+        <p:txBody>
+          <a:bodyPr wrap="square" rtlCol="0">
+            <a:spAutoFit/>
+          </a:bodyPr>
+          <a:lstStyle/>
+          <a:p>
+            <a:r>
+              <a:rPr lang="en-US" dirty="0"/>
+              <a:t>Look at </a:t>
+            </a:r>
+            <a:r>
+              <a:rPr lang="en-US" dirty="0" err="1"/>
+              <a:t>particle.isPU</a:t>
+            </a:r>
+            <a:r>
+              <a:rPr lang="en-US" dirty="0"/>
+              <a:t> for 0 </a:t>
+            </a:r>
+            <a:r>
+              <a:rPr lang="en-US" dirty="0" err="1"/>
+              <a:t>pid</a:t>
+            </a:r>
+            <a:endParaRPr lang="en-US" dirty="0"/>
           </a:p>
         </p:txBody>
       </p:sp>

</xml_diff>